<commit_message>
Feat(chp3): Ajout de notes sur les conditions
Page sur 7
</commit_message>
<xml_diff>
--- a/source/Chapitre 3 - Structures conditionnelles.pptx
+++ b/source/Chapitre 3 - Structures conditionnelles.pptx
@@ -127,6 +127,14 @@
 </p:presentation>
 </file>
 
+<file path=ppt/revisionInfo.xml><?xml version="1.0" encoding="utf-8"?>
+<p1510:revInfo xmlns:a="http://schemas.openxmlformats.org/drawingml/2006/main" xmlns:r="http://schemas.openxmlformats.org/officeDocument/2006/relationships" xmlns:p1510="http://schemas.microsoft.com/office/powerpoint/2015/10/main">
+  <p1510:revLst>
+    <p1510:client id="{4E0E620D-09F9-4BE3-9F03-2E2526FB828A}" v="5" dt="2024-02-11T14:05:41.734"/>
+  </p1510:revLst>
+</p1510:revInfo>
+</file>
+
 <file path=ppt/changesInfos/changesInfo1.xml><?xml version="1.0" encoding="utf-8"?>
 <pc:chgInfo xmlns:a="http://schemas.openxmlformats.org/drawingml/2006/main" xmlns:r="http://schemas.openxmlformats.org/officeDocument/2006/relationships" xmlns:ac="http://schemas.microsoft.com/office/drawing/2013/main/command" xmlns:pc="http://schemas.microsoft.com/office/powerpoint/2013/main/command">
   <pc:docChgLst>
@@ -1413,8 +1421,8 @@
   </pc:docChgLst>
   <pc:docChgLst>
     <pc:chgData name="Ismaël Tuo" userId="fca7baf0e513a1e6" providerId="LiveId" clId="{4E0E620D-09F9-4BE3-9F03-2E2526FB828A}"/>
-    <pc:docChg chg="custSel modSld">
-      <pc:chgData name="Ismaël Tuo" userId="fca7baf0e513a1e6" providerId="LiveId" clId="{4E0E620D-09F9-4BE3-9F03-2E2526FB828A}" dt="2023-11-12T17:37:27.494" v="39" actId="313"/>
+    <pc:docChg chg="undo custSel addSld delSld modSld">
+      <pc:chgData name="Ismaël Tuo" userId="fca7baf0e513a1e6" providerId="LiveId" clId="{4E0E620D-09F9-4BE3-9F03-2E2526FB828A}" dt="2024-02-11T14:09:55.018" v="328" actId="20577"/>
       <pc:docMkLst>
         <pc:docMk/>
       </pc:docMkLst>
@@ -1541,8 +1549,8 @@
           </ac:spMkLst>
         </pc:spChg>
       </pc:sldChg>
-      <pc:sldChg chg="modSp mod">
-        <pc:chgData name="Ismaël Tuo" userId="fca7baf0e513a1e6" providerId="LiveId" clId="{4E0E620D-09F9-4BE3-9F03-2E2526FB828A}" dt="2023-11-12T17:36:03.994" v="22" actId="114"/>
+      <pc:sldChg chg="addSp modSp mod">
+        <pc:chgData name="Ismaël Tuo" userId="fca7baf0e513a1e6" providerId="LiveId" clId="{4E0E620D-09F9-4BE3-9F03-2E2526FB828A}" dt="2024-02-11T14:06:44.013" v="305" actId="1076"/>
         <pc:sldMkLst>
           <pc:docMk/>
           <pc:sldMk cId="1595672233" sldId="290"/>
@@ -1555,6 +1563,14 @@
             <ac:spMk id="6" creationId="{84F10693-2FE8-EFC8-8DB6-84BFD181D260}"/>
           </ac:spMkLst>
         </pc:spChg>
+        <pc:spChg chg="add mod">
+          <ac:chgData name="Ismaël Tuo" userId="fca7baf0e513a1e6" providerId="LiveId" clId="{4E0E620D-09F9-4BE3-9F03-2E2526FB828A}" dt="2024-02-11T14:06:44.013" v="305" actId="1076"/>
+          <ac:spMkLst>
+            <pc:docMk/>
+            <pc:sldMk cId="1595672233" sldId="290"/>
+            <ac:spMk id="9" creationId="{729F2613-7188-63C9-8F70-6088902B2977}"/>
+          </ac:spMkLst>
+        </pc:spChg>
         <pc:spChg chg="mod">
           <ac:chgData name="Ismaël Tuo" userId="fca7baf0e513a1e6" providerId="LiveId" clId="{4E0E620D-09F9-4BE3-9F03-2E2526FB828A}" dt="2023-11-12T17:36:03.994" v="22" actId="114"/>
           <ac:spMkLst>
@@ -1563,6 +1579,94 @@
             <ac:spMk id="11" creationId="{C27A3656-3CB0-8161-AE9F-B92FBE4F5083}"/>
           </ac:spMkLst>
         </pc:spChg>
+        <pc:spChg chg="mod">
+          <ac:chgData name="Ismaël Tuo" userId="fca7baf0e513a1e6" providerId="LiveId" clId="{4E0E620D-09F9-4BE3-9F03-2E2526FB828A}" dt="2024-02-11T14:05:21.358" v="245" actId="164"/>
+          <ac:spMkLst>
+            <pc:docMk/>
+            <pc:sldMk cId="1595672233" sldId="290"/>
+            <ac:spMk id="15" creationId="{D274B488-2E4A-C1DE-1FD6-EC608DB8BC2E}"/>
+          </ac:spMkLst>
+        </pc:spChg>
+        <pc:spChg chg="mod">
+          <ac:chgData name="Ismaël Tuo" userId="fca7baf0e513a1e6" providerId="LiveId" clId="{4E0E620D-09F9-4BE3-9F03-2E2526FB828A}" dt="2024-02-11T14:05:09.038" v="244" actId="164"/>
+          <ac:spMkLst>
+            <pc:docMk/>
+            <pc:sldMk cId="1595672233" sldId="290"/>
+            <ac:spMk id="16" creationId="{6F81B256-F373-8F37-B5E6-CE80B77AABCC}"/>
+          </ac:spMkLst>
+        </pc:spChg>
+        <pc:spChg chg="mod">
+          <ac:chgData name="Ismaël Tuo" userId="fca7baf0e513a1e6" providerId="LiveId" clId="{4E0E620D-09F9-4BE3-9F03-2E2526FB828A}" dt="2024-02-11T14:06:00.152" v="258" actId="1076"/>
+          <ac:spMkLst>
+            <pc:docMk/>
+            <pc:sldMk cId="1595672233" sldId="290"/>
+            <ac:spMk id="17" creationId="{E27150DA-8372-BDC6-6D06-6C093E344A64}"/>
+          </ac:spMkLst>
+        </pc:spChg>
+        <pc:spChg chg="mod">
+          <ac:chgData name="Ismaël Tuo" userId="fca7baf0e513a1e6" providerId="LiveId" clId="{4E0E620D-09F9-4BE3-9F03-2E2526FB828A}" dt="2024-02-11T14:05:49.925" v="255" actId="1076"/>
+          <ac:spMkLst>
+            <pc:docMk/>
+            <pc:sldMk cId="1595672233" sldId="290"/>
+            <ac:spMk id="24" creationId="{2DAA639B-8AEC-2BF3-8CD3-B99AF32098A3}"/>
+          </ac:spMkLst>
+        </pc:spChg>
+        <pc:grpChg chg="add mod">
+          <ac:chgData name="Ismaël Tuo" userId="fca7baf0e513a1e6" providerId="LiveId" clId="{4E0E620D-09F9-4BE3-9F03-2E2526FB828A}" dt="2024-02-11T14:05:25.869" v="248" actId="1076"/>
+          <ac:grpSpMkLst>
+            <pc:docMk/>
+            <pc:sldMk cId="1595672233" sldId="290"/>
+            <ac:grpSpMk id="2" creationId="{613BFCF5-801F-13DD-ACAC-100A2ED64AAD}"/>
+          </ac:grpSpMkLst>
+        </pc:grpChg>
+        <pc:grpChg chg="add mod">
+          <ac:chgData name="Ismaël Tuo" userId="fca7baf0e513a1e6" providerId="LiveId" clId="{4E0E620D-09F9-4BE3-9F03-2E2526FB828A}" dt="2024-02-11T14:05:24.325" v="247" actId="1076"/>
+          <ac:grpSpMkLst>
+            <pc:docMk/>
+            <pc:sldMk cId="1595672233" sldId="290"/>
+            <ac:grpSpMk id="3" creationId="{76E170E1-F2BD-B261-DEA0-F05343011F83}"/>
+          </ac:grpSpMkLst>
+        </pc:grpChg>
+        <pc:grpChg chg="add mod">
+          <ac:chgData name="Ismaël Tuo" userId="fca7baf0e513a1e6" providerId="LiveId" clId="{4E0E620D-09F9-4BE3-9F03-2E2526FB828A}" dt="2024-02-11T14:06:01.765" v="259" actId="1076"/>
+          <ac:grpSpMkLst>
+            <pc:docMk/>
+            <pc:sldMk cId="1595672233" sldId="290"/>
+            <ac:grpSpMk id="8" creationId="{35146CCB-61FE-A898-4CD7-B51389234DC9}"/>
+          </ac:grpSpMkLst>
+        </pc:grpChg>
+        <pc:picChg chg="mod">
+          <ac:chgData name="Ismaël Tuo" userId="fca7baf0e513a1e6" providerId="LiveId" clId="{4E0E620D-09F9-4BE3-9F03-2E2526FB828A}" dt="2024-02-11T14:05:21.358" v="245" actId="164"/>
+          <ac:picMkLst>
+            <pc:docMk/>
+            <pc:sldMk cId="1595672233" sldId="290"/>
+            <ac:picMk id="7" creationId="{E30B4477-0E17-85EC-6668-EC93DC4C2511}"/>
+          </ac:picMkLst>
+        </pc:picChg>
+        <pc:picChg chg="mod">
+          <ac:chgData name="Ismaël Tuo" userId="fca7baf0e513a1e6" providerId="LiveId" clId="{4E0E620D-09F9-4BE3-9F03-2E2526FB828A}" dt="2024-02-11T14:05:34.006" v="250" actId="164"/>
+          <ac:picMkLst>
+            <pc:docMk/>
+            <pc:sldMk cId="1595672233" sldId="290"/>
+            <ac:picMk id="21" creationId="{41971E4D-1F95-4215-64F3-26C67EA0EEFA}"/>
+          </ac:picMkLst>
+        </pc:picChg>
+        <pc:picChg chg="mod">
+          <ac:chgData name="Ismaël Tuo" userId="fca7baf0e513a1e6" providerId="LiveId" clId="{4E0E620D-09F9-4BE3-9F03-2E2526FB828A}" dt="2024-02-11T14:05:34.006" v="250" actId="164"/>
+          <ac:picMkLst>
+            <pc:docMk/>
+            <pc:sldMk cId="1595672233" sldId="290"/>
+            <ac:picMk id="23" creationId="{76069E87-9F61-D3C9-1D55-C506F5C1F2B8}"/>
+          </ac:picMkLst>
+        </pc:picChg>
+        <pc:picChg chg="mod">
+          <ac:chgData name="Ismaël Tuo" userId="fca7baf0e513a1e6" providerId="LiveId" clId="{4E0E620D-09F9-4BE3-9F03-2E2526FB828A}" dt="2024-02-11T14:05:09.038" v="244" actId="164"/>
+          <ac:picMkLst>
+            <pc:docMk/>
+            <pc:sldMk cId="1595672233" sldId="290"/>
+            <ac:picMk id="27" creationId="{ED9430C5-12BA-2F4F-BE07-ECF4E6174D74}"/>
+          </ac:picMkLst>
+        </pc:picChg>
       </pc:sldChg>
       <pc:sldChg chg="modSp mod">
         <pc:chgData name="Ismaël Tuo" userId="fca7baf0e513a1e6" providerId="LiveId" clId="{4E0E620D-09F9-4BE3-9F03-2E2526FB828A}" dt="2023-11-12T17:36:24.579" v="26" actId="114"/>
@@ -1596,13 +1700,13 @@
         </pc:spChg>
       </pc:sldChg>
       <pc:sldChg chg="modSp mod">
-        <pc:chgData name="Ismaël Tuo" userId="fca7baf0e513a1e6" providerId="LiveId" clId="{4E0E620D-09F9-4BE3-9F03-2E2526FB828A}" dt="2023-11-12T17:36:39.282" v="29" actId="114"/>
+        <pc:chgData name="Ismaël Tuo" userId="fca7baf0e513a1e6" providerId="LiveId" clId="{4E0E620D-09F9-4BE3-9F03-2E2526FB828A}" dt="2024-02-11T14:09:55.018" v="328" actId="20577"/>
         <pc:sldMkLst>
           <pc:docMk/>
           <pc:sldMk cId="2521371462" sldId="292"/>
         </pc:sldMkLst>
         <pc:spChg chg="mod">
-          <ac:chgData name="Ismaël Tuo" userId="fca7baf0e513a1e6" providerId="LiveId" clId="{4E0E620D-09F9-4BE3-9F03-2E2526FB828A}" dt="2023-11-12T17:36:39.282" v="29" actId="114"/>
+          <ac:chgData name="Ismaël Tuo" userId="fca7baf0e513a1e6" providerId="LiveId" clId="{4E0E620D-09F9-4BE3-9F03-2E2526FB828A}" dt="2024-02-11T14:09:50.750" v="326" actId="1076"/>
           <ac:spMkLst>
             <pc:docMk/>
             <pc:sldMk cId="2521371462" sldId="292"/>
@@ -1617,6 +1721,30 @@
             <ac:spMk id="6" creationId="{84F10693-2FE8-EFC8-8DB6-84BFD181D260}"/>
           </ac:spMkLst>
         </pc:spChg>
+        <pc:spChg chg="mod">
+          <ac:chgData name="Ismaël Tuo" userId="fca7baf0e513a1e6" providerId="LiveId" clId="{4E0E620D-09F9-4BE3-9F03-2E2526FB828A}" dt="2024-02-11T14:09:46.107" v="324" actId="1076"/>
+          <ac:spMkLst>
+            <pc:docMk/>
+            <pc:sldMk cId="2521371462" sldId="292"/>
+            <ac:spMk id="10" creationId="{C0714A99-B1CF-E152-B70C-AE0F4B5B0070}"/>
+          </ac:spMkLst>
+        </pc:spChg>
+        <pc:graphicFrameChg chg="mod modGraphic">
+          <ac:chgData name="Ismaël Tuo" userId="fca7baf0e513a1e6" providerId="LiveId" clId="{4E0E620D-09F9-4BE3-9F03-2E2526FB828A}" dt="2024-02-11T14:09:55.018" v="328" actId="20577"/>
+          <ac:graphicFrameMkLst>
+            <pc:docMk/>
+            <pc:sldMk cId="2521371462" sldId="292"/>
+            <ac:graphicFrameMk id="2" creationId="{B97CCD90-FCAF-6F56-C391-2BBE30914BB1}"/>
+          </ac:graphicFrameMkLst>
+        </pc:graphicFrameChg>
+        <pc:picChg chg="mod">
+          <ac:chgData name="Ismaël Tuo" userId="fca7baf0e513a1e6" providerId="LiveId" clId="{4E0E620D-09F9-4BE3-9F03-2E2526FB828A}" dt="2024-02-11T14:09:47.323" v="325" actId="1076"/>
+          <ac:picMkLst>
+            <pc:docMk/>
+            <pc:sldMk cId="2521371462" sldId="292"/>
+            <ac:picMk id="8" creationId="{D09DF181-280C-AEA2-DD5B-0E6E0F9E0391}"/>
+          </ac:picMkLst>
+        </pc:picChg>
       </pc:sldChg>
       <pc:sldChg chg="modSp mod">
         <pc:chgData name="Ismaël Tuo" userId="fca7baf0e513a1e6" providerId="LiveId" clId="{4E0E620D-09F9-4BE3-9F03-2E2526FB828A}" dt="2023-11-12T17:37:11.583" v="36" actId="114"/>
@@ -1694,6 +1822,93 @@
             <ac:spMk id="13" creationId="{58861DE0-74CC-61E5-2059-4F7561A1E631}"/>
           </ac:spMkLst>
         </pc:spChg>
+      </pc:sldChg>
+      <pc:sldChg chg="addSp delSp modSp add del mod">
+        <pc:chgData name="Ismaël Tuo" userId="fca7baf0e513a1e6" providerId="LiveId" clId="{4E0E620D-09F9-4BE3-9F03-2E2526FB828A}" dt="2024-02-11T14:06:08.518" v="261" actId="2696"/>
+        <pc:sldMkLst>
+          <pc:docMk/>
+          <pc:sldMk cId="1163354048" sldId="296"/>
+        </pc:sldMkLst>
+        <pc:spChg chg="add del mod">
+          <ac:chgData name="Ismaël Tuo" userId="fca7baf0e513a1e6" providerId="LiveId" clId="{4E0E620D-09F9-4BE3-9F03-2E2526FB828A}" dt="2024-02-11T14:04:51.992" v="239" actId="478"/>
+          <ac:spMkLst>
+            <pc:docMk/>
+            <pc:sldMk cId="1163354048" sldId="296"/>
+            <ac:spMk id="2" creationId="{F640F030-AED4-18D6-E8DC-573F37B243CC}"/>
+          </ac:spMkLst>
+        </pc:spChg>
+        <pc:spChg chg="mod">
+          <ac:chgData name="Ismaël Tuo" userId="fca7baf0e513a1e6" providerId="LiveId" clId="{4E0E620D-09F9-4BE3-9F03-2E2526FB828A}" dt="2024-02-11T14:04:27.529" v="230" actId="20577"/>
+          <ac:spMkLst>
+            <pc:docMk/>
+            <pc:sldMk cId="1163354048" sldId="296"/>
+            <ac:spMk id="11" creationId="{9A1162A9-30A5-9094-07ED-FF6CAD6781C3}"/>
+          </ac:spMkLst>
+        </pc:spChg>
+        <pc:spChg chg="del">
+          <ac:chgData name="Ismaël Tuo" userId="fca7baf0e513a1e6" providerId="LiveId" clId="{4E0E620D-09F9-4BE3-9F03-2E2526FB828A}" dt="2024-02-11T14:03:09.471" v="41" actId="478"/>
+          <ac:spMkLst>
+            <pc:docMk/>
+            <pc:sldMk cId="1163354048" sldId="296"/>
+            <ac:spMk id="15" creationId="{C8CCD562-F552-E88B-3833-426351499EF3}"/>
+          </ac:spMkLst>
+        </pc:spChg>
+        <pc:spChg chg="del">
+          <ac:chgData name="Ismaël Tuo" userId="fca7baf0e513a1e6" providerId="LiveId" clId="{4E0E620D-09F9-4BE3-9F03-2E2526FB828A}" dt="2024-02-11T14:03:11.066" v="42" actId="478"/>
+          <ac:spMkLst>
+            <pc:docMk/>
+            <pc:sldMk cId="1163354048" sldId="296"/>
+            <ac:spMk id="16" creationId="{7E989940-4689-209E-54E3-EBAE1B7B992C}"/>
+          </ac:spMkLst>
+        </pc:spChg>
+        <pc:spChg chg="del">
+          <ac:chgData name="Ismaël Tuo" userId="fca7baf0e513a1e6" providerId="LiveId" clId="{4E0E620D-09F9-4BE3-9F03-2E2526FB828A}" dt="2024-02-11T14:03:12.417" v="43" actId="478"/>
+          <ac:spMkLst>
+            <pc:docMk/>
+            <pc:sldMk cId="1163354048" sldId="296"/>
+            <ac:spMk id="17" creationId="{F7C69BBD-F818-0274-A04C-92C3C3042F4B}"/>
+          </ac:spMkLst>
+        </pc:spChg>
+        <pc:spChg chg="del">
+          <ac:chgData name="Ismaël Tuo" userId="fca7baf0e513a1e6" providerId="LiveId" clId="{4E0E620D-09F9-4BE3-9F03-2E2526FB828A}" dt="2024-02-11T14:03:15.119" v="45" actId="478"/>
+          <ac:spMkLst>
+            <pc:docMk/>
+            <pc:sldMk cId="1163354048" sldId="296"/>
+            <ac:spMk id="24" creationId="{E5055AB8-D480-C41B-3539-A6B66EA6D96F}"/>
+          </ac:spMkLst>
+        </pc:spChg>
+        <pc:picChg chg="del">
+          <ac:chgData name="Ismaël Tuo" userId="fca7baf0e513a1e6" providerId="LiveId" clId="{4E0E620D-09F9-4BE3-9F03-2E2526FB828A}" dt="2024-02-11T14:03:09.471" v="41" actId="478"/>
+          <ac:picMkLst>
+            <pc:docMk/>
+            <pc:sldMk cId="1163354048" sldId="296"/>
+            <ac:picMk id="7" creationId="{EEB852D1-C318-B679-E5A8-44BD3B2DAD91}"/>
+          </ac:picMkLst>
+        </pc:picChg>
+        <pc:picChg chg="del">
+          <ac:chgData name="Ismaël Tuo" userId="fca7baf0e513a1e6" providerId="LiveId" clId="{4E0E620D-09F9-4BE3-9F03-2E2526FB828A}" dt="2024-02-11T14:03:15.971" v="46" actId="478"/>
+          <ac:picMkLst>
+            <pc:docMk/>
+            <pc:sldMk cId="1163354048" sldId="296"/>
+            <ac:picMk id="21" creationId="{F91BCA98-8753-F016-E325-BA8176F3306D}"/>
+          </ac:picMkLst>
+        </pc:picChg>
+        <pc:picChg chg="del">
+          <ac:chgData name="Ismaël Tuo" userId="fca7baf0e513a1e6" providerId="LiveId" clId="{4E0E620D-09F9-4BE3-9F03-2E2526FB828A}" dt="2024-02-11T14:03:13.140" v="44" actId="478"/>
+          <ac:picMkLst>
+            <pc:docMk/>
+            <pc:sldMk cId="1163354048" sldId="296"/>
+            <ac:picMk id="23" creationId="{446B07D8-E0FE-305E-D917-E716CA53E112}"/>
+          </ac:picMkLst>
+        </pc:picChg>
+        <pc:picChg chg="del">
+          <ac:chgData name="Ismaël Tuo" userId="fca7baf0e513a1e6" providerId="LiveId" clId="{4E0E620D-09F9-4BE3-9F03-2E2526FB828A}" dt="2024-02-11T14:03:09.471" v="41" actId="478"/>
+          <ac:picMkLst>
+            <pc:docMk/>
+            <pc:sldMk cId="1163354048" sldId="296"/>
+            <ac:picMk id="27" creationId="{E820D260-8E1F-1957-6E37-C1FC40B91F62}"/>
+          </ac:picMkLst>
+        </pc:picChg>
       </pc:sldChg>
     </pc:docChg>
   </pc:docChgLst>
@@ -1782,7 +1997,7 @@
           <a:p>
             <a:fld id="{5D1B8971-FAD5-A544-A565-5C81831E2E08}" type="datetimeFigureOut">
               <a:rPr lang="fr-FR" smtClean="0"/>
-              <a:t>12/11/2023</a:t>
+              <a:t>11/02/2024</a:t>
             </a:fld>
             <a:endParaRPr lang="fr-FR"/>
           </a:p>
@@ -2632,7 +2847,7 @@
           <a:p>
             <a:fld id="{446AF453-C717-E044-9B61-C449088DBB9F}" type="datetime1">
               <a:rPr lang="fr-FR" smtClean="0"/>
-              <a:t>12/11/2023</a:t>
+              <a:t>11/02/2024</a:t>
             </a:fld>
             <a:endParaRPr lang="fr-FR"/>
           </a:p>
@@ -2806,7 +3021,7 @@
           <a:p>
             <a:fld id="{0AD74B8B-4B66-A54B-A7E1-EB9F6C09CE67}" type="datetime1">
               <a:rPr lang="fr-FR" smtClean="0"/>
-              <a:t>12/11/2023</a:t>
+              <a:t>11/02/2024</a:t>
             </a:fld>
             <a:endParaRPr lang="fr-FR"/>
           </a:p>
@@ -2990,7 +3205,7 @@
           <a:p>
             <a:fld id="{9584F9F2-42A0-CD42-8013-986AEAF97421}" type="datetime1">
               <a:rPr lang="fr-FR" smtClean="0"/>
-              <a:t>12/11/2023</a:t>
+              <a:t>11/02/2024</a:t>
             </a:fld>
             <a:endParaRPr lang="fr-FR"/>
           </a:p>
@@ -3164,7 +3379,7 @@
           <a:p>
             <a:fld id="{DAB9BD9F-3179-BB4C-96AB-C40862581685}" type="datetime1">
               <a:rPr lang="fr-FR" smtClean="0"/>
-              <a:t>12/11/2023</a:t>
+              <a:t>11/02/2024</a:t>
             </a:fld>
             <a:endParaRPr lang="fr-FR"/>
           </a:p>
@@ -3436,7 +3651,7 @@
           <a:p>
             <a:fld id="{A664DE96-64FF-BC43-8A9C-18ED43A528D6}" type="datetime1">
               <a:rPr lang="fr-FR" smtClean="0"/>
-              <a:t>12/11/2023</a:t>
+              <a:t>11/02/2024</a:t>
             </a:fld>
             <a:endParaRPr lang="fr-FR"/>
           </a:p>
@@ -3672,7 +3887,7 @@
           <a:p>
             <a:fld id="{2C8FE800-9F9B-1C4F-A1CD-9EF46842C4CA}" type="datetime1">
               <a:rPr lang="fr-FR" smtClean="0"/>
-              <a:t>12/11/2023</a:t>
+              <a:t>11/02/2024</a:t>
             </a:fld>
             <a:endParaRPr lang="fr-FR"/>
           </a:p>
@@ -4035,7 +4250,7 @@
           <a:p>
             <a:fld id="{0F7DED4E-8CB4-EF40-A349-EFC02EC7784E}" type="datetime1">
               <a:rPr lang="fr-FR" smtClean="0"/>
-              <a:t>12/11/2023</a:t>
+              <a:t>11/02/2024</a:t>
             </a:fld>
             <a:endParaRPr lang="fr-FR"/>
           </a:p>
@@ -4180,7 +4395,7 @@
           <a:p>
             <a:fld id="{5BB88D77-E8A2-E24F-81D2-817E60779F3E}" type="datetime1">
               <a:rPr lang="fr-FR" smtClean="0"/>
-              <a:t>12/11/2023</a:t>
+              <a:t>11/02/2024</a:t>
             </a:fld>
             <a:endParaRPr lang="fr-FR"/>
           </a:p>
@@ -4279,7 +4494,7 @@
           <a:p>
             <a:fld id="{817F964E-5B57-884A-A1B8-925BFA5276AF}" type="datetime1">
               <a:rPr lang="fr-FR" smtClean="0"/>
-              <a:t>12/11/2023</a:t>
+              <a:t>11/02/2024</a:t>
             </a:fld>
             <a:endParaRPr lang="fr-FR"/>
           </a:p>
@@ -4640,7 +4855,7 @@
           <a:p>
             <a:fld id="{D5636CD0-A2E6-1543-A0E5-C829C16FEE55}" type="datetime1">
               <a:rPr lang="fr-FR" smtClean="0"/>
-              <a:t>12/11/2023</a:t>
+              <a:t>11/02/2024</a:t>
             </a:fld>
             <a:endParaRPr lang="fr-FR"/>
           </a:p>
@@ -5001,7 +5216,7 @@
           <a:p>
             <a:fld id="{CEE5CE4A-5B1A-1846-BA66-722BDB7A9525}" type="datetime1">
               <a:rPr lang="fr-FR" smtClean="0"/>
-              <a:t>12/11/2023</a:t>
+              <a:t>11/02/2024</a:t>
             </a:fld>
             <a:endParaRPr lang="fr-FR"/>
           </a:p>
@@ -5248,7 +5463,7 @@
           <a:p>
             <a:fld id="{55A13D9C-CA6E-9C45-8634-4423EBFFD553}" type="datetime1">
               <a:rPr lang="fr-FR" smtClean="0"/>
-              <a:t>12/11/2023</a:t>
+              <a:t>11/02/2024</a:t>
             </a:fld>
             <a:endParaRPr lang="fr-FR"/>
           </a:p>
@@ -9863,7 +10078,7 @@
           <a:lstStyle/>
           <a:p>
             <a:r>
-              <a:rPr lang="fr-FR"/>
+              <a:rPr lang="fr-FR" dirty="0"/>
               <a:t>Cours: Python | Auteur: TUO N. Ismaël Maurice 
 </a:t>
             </a:r>
@@ -10088,112 +10303,95 @@
           </a:fontRef>
         </p:style>
       </p:cxnSp>
-      <p:pic>
-        <p:nvPicPr>
-          <p:cNvPr id="7" name="Image 6" descr="Une image contenant texte, Police, capture d’écran&#10;&#10;Description générée automatiquement">
+      <p:grpSp>
+        <p:nvGrpSpPr>
+          <p:cNvPr id="3" name="Groupe 2">
             <a:extLst>
               <a:ext uri="{FF2B5EF4-FFF2-40B4-BE49-F238E27FC236}">
-                <a16:creationId xmlns:a16="http://schemas.microsoft.com/office/drawing/2014/main" id="{E30B4477-0E17-85EC-6668-EC93DC4C2511}"/>
+                <a16:creationId xmlns:a16="http://schemas.microsoft.com/office/drawing/2014/main" id="{76E170E1-F2BD-B261-DEA0-F05343011F83}"/>
               </a:ext>
             </a:extLst>
           </p:cNvPr>
-          <p:cNvPicPr>
-            <a:picLocks noChangeAspect="1"/>
-          </p:cNvPicPr>
+          <p:cNvGrpSpPr/>
           <p:nvPr/>
-        </p:nvPicPr>
-        <p:blipFill>
-          <a:blip r:embed="rId2"/>
-          <a:stretch>
-            <a:fillRect/>
-          </a:stretch>
-        </p:blipFill>
-        <p:spPr>
+        </p:nvGrpSpPr>
+        <p:grpSpPr>
           <a:xfrm>
-            <a:off x="1175480" y="1585471"/>
-            <a:ext cx="3375314" cy="1257300"/>
+            <a:off x="1075812" y="1357940"/>
+            <a:ext cx="3375314" cy="1567015"/>
+            <a:chOff x="1075812" y="1417730"/>
+            <a:chExt cx="3375314" cy="1567015"/>
           </a:xfrm>
-          <a:prstGeom prst="rect">
-            <a:avLst/>
-          </a:prstGeom>
-        </p:spPr>
-      </p:pic>
-      <p:sp>
-        <p:nvSpPr>
-          <p:cNvPr id="15" name="ZoneTexte 14">
-            <a:extLst>
-              <a:ext uri="{FF2B5EF4-FFF2-40B4-BE49-F238E27FC236}">
-                <a16:creationId xmlns:a16="http://schemas.microsoft.com/office/drawing/2014/main" id="{D274B488-2E4A-C1DE-1FD6-EC608DB8BC2E}"/>
-              </a:ext>
-            </a:extLst>
-          </p:cNvPr>
-          <p:cNvSpPr txBox="1"/>
-          <p:nvPr/>
-        </p:nvSpPr>
-        <p:spPr>
-          <a:xfrm>
-            <a:off x="2060170" y="2842771"/>
-            <a:ext cx="1406599" cy="338554"/>
-          </a:xfrm>
-          <a:prstGeom prst="rect">
-            <a:avLst/>
-          </a:prstGeom>
-          <a:noFill/>
-        </p:spPr>
-        <p:txBody>
-          <a:bodyPr wrap="square" rtlCol="0">
-            <a:spAutoFit/>
-          </a:bodyPr>
-          <a:lstStyle/>
-          <a:p>
-            <a:r>
-              <a:rPr lang="fr-FR" sz="1600" dirty="0">
-                <a:latin typeface="Times New Roman" panose="02020603050405020304" pitchFamily="18" charset="0"/>
-                <a:cs typeface="Times New Roman" panose="02020603050405020304" pitchFamily="18" charset="0"/>
-              </a:rPr>
-              <a:t>Suite de tests</a:t>
-            </a:r>
-          </a:p>
-        </p:txBody>
-      </p:sp>
-      <p:sp>
-        <p:nvSpPr>
-          <p:cNvPr id="16" name="ZoneTexte 15">
-            <a:extLst>
-              <a:ext uri="{FF2B5EF4-FFF2-40B4-BE49-F238E27FC236}">
-                <a16:creationId xmlns:a16="http://schemas.microsoft.com/office/drawing/2014/main" id="{6F81B256-F373-8F37-B5E6-CE80B77AABCC}"/>
-              </a:ext>
-            </a:extLst>
-          </p:cNvPr>
-          <p:cNvSpPr txBox="1"/>
-          <p:nvPr/>
-        </p:nvSpPr>
-        <p:spPr>
-          <a:xfrm>
-            <a:off x="7501389" y="2897120"/>
-            <a:ext cx="1856773" cy="338554"/>
-          </a:xfrm>
-          <a:prstGeom prst="rect">
-            <a:avLst/>
-          </a:prstGeom>
-          <a:noFill/>
-        </p:spPr>
-        <p:txBody>
-          <a:bodyPr wrap="square" rtlCol="0">
-            <a:spAutoFit/>
-          </a:bodyPr>
-          <a:lstStyle/>
-          <a:p>
-            <a:r>
-              <a:rPr lang="fr-FR" sz="1600" dirty="0">
-                <a:latin typeface="Times New Roman" panose="02020603050405020304" pitchFamily="18" charset="0"/>
-                <a:cs typeface="Times New Roman" panose="02020603050405020304" pitchFamily="18" charset="0"/>
-              </a:rPr>
-              <a:t>Tests imbriqués</a:t>
-            </a:r>
-          </a:p>
-        </p:txBody>
-      </p:sp>
+        </p:grpSpPr>
+        <p:pic>
+          <p:nvPicPr>
+            <p:cNvPr id="7" name="Image 6" descr="Une image contenant texte, Police, capture d’écran&#10;&#10;Description générée automatiquement">
+              <a:extLst>
+                <a:ext uri="{FF2B5EF4-FFF2-40B4-BE49-F238E27FC236}">
+                  <a16:creationId xmlns:a16="http://schemas.microsoft.com/office/drawing/2014/main" id="{E30B4477-0E17-85EC-6668-EC93DC4C2511}"/>
+                </a:ext>
+              </a:extLst>
+            </p:cNvPr>
+            <p:cNvPicPr>
+              <a:picLocks noChangeAspect="1"/>
+            </p:cNvPicPr>
+            <p:nvPr/>
+          </p:nvPicPr>
+          <p:blipFill>
+            <a:blip r:embed="rId2"/>
+            <a:stretch>
+              <a:fillRect/>
+            </a:stretch>
+          </p:blipFill>
+          <p:spPr>
+            <a:xfrm>
+              <a:off x="1075812" y="1417730"/>
+              <a:ext cx="3375314" cy="1257300"/>
+            </a:xfrm>
+            <a:prstGeom prst="rect">
+              <a:avLst/>
+            </a:prstGeom>
+          </p:spPr>
+        </p:pic>
+        <p:sp>
+          <p:nvSpPr>
+            <p:cNvPr id="15" name="ZoneTexte 14">
+              <a:extLst>
+                <a:ext uri="{FF2B5EF4-FFF2-40B4-BE49-F238E27FC236}">
+                  <a16:creationId xmlns:a16="http://schemas.microsoft.com/office/drawing/2014/main" id="{D274B488-2E4A-C1DE-1FD6-EC608DB8BC2E}"/>
+                </a:ext>
+              </a:extLst>
+            </p:cNvPr>
+            <p:cNvSpPr txBox="1"/>
+            <p:nvPr/>
+          </p:nvSpPr>
+          <p:spPr>
+            <a:xfrm>
+              <a:off x="1932167" y="2646191"/>
+              <a:ext cx="1406599" cy="338554"/>
+            </a:xfrm>
+            <a:prstGeom prst="rect">
+              <a:avLst/>
+            </a:prstGeom>
+            <a:noFill/>
+          </p:spPr>
+          <p:txBody>
+            <a:bodyPr wrap="square" rtlCol="0">
+              <a:spAutoFit/>
+            </a:bodyPr>
+            <a:lstStyle/>
+            <a:p>
+              <a:r>
+                <a:rPr lang="fr-FR" sz="1600" dirty="0">
+                  <a:latin typeface="Times New Roman" panose="02020603050405020304" pitchFamily="18" charset="0"/>
+                  <a:cs typeface="Times New Roman" panose="02020603050405020304" pitchFamily="18" charset="0"/>
+                </a:rPr>
+                <a:t>Suite de tests</a:t>
+              </a:r>
+            </a:p>
+          </p:txBody>
+        </p:sp>
+      </p:grpSp>
       <p:sp>
         <p:nvSpPr>
           <p:cNvPr id="17" name="ZoneTexte 16">
@@ -10208,7 +10406,7 @@
         </p:nvSpPr>
         <p:spPr>
           <a:xfrm>
-            <a:off x="500932" y="3338356"/>
+            <a:off x="523055" y="2807995"/>
             <a:ext cx="11286636" cy="400110"/>
           </a:xfrm>
           <a:prstGeom prst="rect">
@@ -10232,148 +10430,403 @@
           </a:p>
         </p:txBody>
       </p:sp>
-      <p:pic>
-        <p:nvPicPr>
-          <p:cNvPr id="21" name="Image 20" descr="Une image contenant texte, Police, capture d’écran&#10;&#10;Description générée automatiquement">
+      <p:grpSp>
+        <p:nvGrpSpPr>
+          <p:cNvPr id="8" name="Groupe 7">
             <a:extLst>
               <a:ext uri="{FF2B5EF4-FFF2-40B4-BE49-F238E27FC236}">
-                <a16:creationId xmlns:a16="http://schemas.microsoft.com/office/drawing/2014/main" id="{41971E4D-1F95-4215-64F3-26C67EA0EEFA}"/>
+                <a16:creationId xmlns:a16="http://schemas.microsoft.com/office/drawing/2014/main" id="{35146CCB-61FE-A898-4CD7-B51389234DC9}"/>
               </a:ext>
             </a:extLst>
           </p:cNvPr>
-          <p:cNvPicPr>
-            <a:picLocks noChangeAspect="1"/>
-          </p:cNvPicPr>
+          <p:cNvGrpSpPr/>
           <p:nvPr/>
-        </p:nvPicPr>
-        <p:blipFill>
-          <a:blip r:embed="rId3"/>
-          <a:stretch>
-            <a:fillRect/>
-          </a:stretch>
-        </p:blipFill>
+        </p:nvGrpSpPr>
+        <p:grpSpPr>
+          <a:xfrm>
+            <a:off x="856767" y="3116940"/>
+            <a:ext cx="10085035" cy="2030972"/>
+            <a:chOff x="930477" y="3906070"/>
+            <a:chExt cx="10085035" cy="2030972"/>
+          </a:xfrm>
+        </p:grpSpPr>
+        <p:pic>
+          <p:nvPicPr>
+            <p:cNvPr id="21" name="Image 20" descr="Une image contenant texte, Police, capture d’écran&#10;&#10;Description générée automatiquement">
+              <a:extLst>
+                <a:ext uri="{FF2B5EF4-FFF2-40B4-BE49-F238E27FC236}">
+                  <a16:creationId xmlns:a16="http://schemas.microsoft.com/office/drawing/2014/main" id="{41971E4D-1F95-4215-64F3-26C67EA0EEFA}"/>
+                </a:ext>
+              </a:extLst>
+            </p:cNvPr>
+            <p:cNvPicPr>
+              <a:picLocks noChangeAspect="1"/>
+            </p:cNvPicPr>
+            <p:nvPr/>
+          </p:nvPicPr>
+          <p:blipFill>
+            <a:blip r:embed="rId3"/>
+            <a:stretch>
+              <a:fillRect/>
+            </a:stretch>
+          </p:blipFill>
+          <p:spPr>
+            <a:xfrm>
+              <a:off x="930477" y="3906070"/>
+              <a:ext cx="3098800" cy="1917700"/>
+            </a:xfrm>
+            <a:prstGeom prst="rect">
+              <a:avLst/>
+            </a:prstGeom>
+          </p:spPr>
+        </p:pic>
+        <p:pic>
+          <p:nvPicPr>
+            <p:cNvPr id="23" name="Image 22" descr="Une image contenant texte, Police, capture d’écran&#10;&#10;Description générée automatiquement">
+              <a:extLst>
+                <a:ext uri="{FF2B5EF4-FFF2-40B4-BE49-F238E27FC236}">
+                  <a16:creationId xmlns:a16="http://schemas.microsoft.com/office/drawing/2014/main" id="{76069E87-9F61-D3C9-1D55-C506F5C1F2B8}"/>
+                </a:ext>
+              </a:extLst>
+            </p:cNvPr>
+            <p:cNvPicPr>
+              <a:picLocks noChangeAspect="1"/>
+            </p:cNvPicPr>
+            <p:nvPr/>
+          </p:nvPicPr>
+          <p:blipFill>
+            <a:blip r:embed="rId4"/>
+            <a:stretch>
+              <a:fillRect/>
+            </a:stretch>
+          </p:blipFill>
+          <p:spPr>
+            <a:xfrm>
+              <a:off x="7700812" y="4019342"/>
+              <a:ext cx="3314700" cy="1917700"/>
+            </a:xfrm>
+            <a:prstGeom prst="rect">
+              <a:avLst/>
+            </a:prstGeom>
+          </p:spPr>
+        </p:pic>
+        <p:sp>
+          <p:nvSpPr>
+            <p:cNvPr id="24" name="Flèche vers la droite 23">
+              <a:extLst>
+                <a:ext uri="{FF2B5EF4-FFF2-40B4-BE49-F238E27FC236}">
+                  <a16:creationId xmlns:a16="http://schemas.microsoft.com/office/drawing/2014/main" id="{2DAA639B-8AEC-2BF3-8CD3-B99AF32098A3}"/>
+                </a:ext>
+              </a:extLst>
+            </p:cNvPr>
+            <p:cNvSpPr/>
+            <p:nvPr/>
+          </p:nvSpPr>
+          <p:spPr>
+            <a:xfrm>
+              <a:off x="4184611" y="4702477"/>
+              <a:ext cx="3316778" cy="551431"/>
+            </a:xfrm>
+            <a:prstGeom prst="rightArrow">
+              <a:avLst/>
+            </a:prstGeom>
+          </p:spPr>
+          <p:style>
+            <a:lnRef idx="2">
+              <a:schemeClr val="accent2">
+                <a:shade val="15000"/>
+              </a:schemeClr>
+            </a:lnRef>
+            <a:fillRef idx="1">
+              <a:schemeClr val="accent2"/>
+            </a:fillRef>
+            <a:effectRef idx="0">
+              <a:schemeClr val="accent2"/>
+            </a:effectRef>
+            <a:fontRef idx="minor">
+              <a:schemeClr val="lt1"/>
+            </a:fontRef>
+          </p:style>
+          <p:txBody>
+            <a:bodyPr rtlCol="0" anchor="ctr"/>
+            <a:lstStyle/>
+            <a:p>
+              <a:pPr algn="ctr"/>
+              <a:r>
+                <a:rPr lang="fr-FR" dirty="0">
+                  <a:latin typeface="Times New Roman" panose="02020603050405020304" pitchFamily="18" charset="0"/>
+                  <a:cs typeface="Times New Roman" panose="02020603050405020304" pitchFamily="18" charset="0"/>
+                </a:rPr>
+                <a:t>Est équivalent à</a:t>
+              </a:r>
+            </a:p>
+          </p:txBody>
+        </p:sp>
+      </p:grpSp>
+      <p:grpSp>
+        <p:nvGrpSpPr>
+          <p:cNvPr id="2" name="Groupe 1">
+            <a:extLst>
+              <a:ext uri="{FF2B5EF4-FFF2-40B4-BE49-F238E27FC236}">
+                <a16:creationId xmlns:a16="http://schemas.microsoft.com/office/drawing/2014/main" id="{613BFCF5-801F-13DD-ACAC-100A2ED64AAD}"/>
+              </a:ext>
+            </a:extLst>
+          </p:cNvPr>
+          <p:cNvGrpSpPr/>
+          <p:nvPr/>
+        </p:nvGrpSpPr>
+        <p:grpSpPr>
+          <a:xfrm>
+            <a:off x="6166373" y="1187188"/>
+            <a:ext cx="3822700" cy="1849854"/>
+            <a:chOff x="6175592" y="1218216"/>
+            <a:chExt cx="3822700" cy="1849854"/>
+          </a:xfrm>
+        </p:grpSpPr>
+        <p:sp>
+          <p:nvSpPr>
+            <p:cNvPr id="16" name="ZoneTexte 15">
+              <a:extLst>
+                <a:ext uri="{FF2B5EF4-FFF2-40B4-BE49-F238E27FC236}">
+                  <a16:creationId xmlns:a16="http://schemas.microsoft.com/office/drawing/2014/main" id="{6F81B256-F373-8F37-B5E6-CE80B77AABCC}"/>
+                </a:ext>
+              </a:extLst>
+            </p:cNvPr>
+            <p:cNvSpPr txBox="1"/>
+            <p:nvPr/>
+          </p:nvSpPr>
+          <p:spPr>
+            <a:xfrm>
+              <a:off x="7425975" y="2729516"/>
+              <a:ext cx="1856773" cy="338554"/>
+            </a:xfrm>
+            <a:prstGeom prst="rect">
+              <a:avLst/>
+            </a:prstGeom>
+            <a:noFill/>
+          </p:spPr>
+          <p:txBody>
+            <a:bodyPr wrap="square" rtlCol="0">
+              <a:spAutoFit/>
+            </a:bodyPr>
+            <a:lstStyle/>
+            <a:p>
+              <a:r>
+                <a:rPr lang="fr-FR" sz="1600" dirty="0">
+                  <a:latin typeface="Times New Roman" panose="02020603050405020304" pitchFamily="18" charset="0"/>
+                  <a:cs typeface="Times New Roman" panose="02020603050405020304" pitchFamily="18" charset="0"/>
+                </a:rPr>
+                <a:t>Tests imbriqués</a:t>
+              </a:r>
+            </a:p>
+          </p:txBody>
+        </p:sp>
+        <p:pic>
+          <p:nvPicPr>
+            <p:cNvPr id="27" name="Image 26" descr="Une image contenant texte, Police, capture d’écran&#10;&#10;Description générée automatiquement">
+              <a:extLst>
+                <a:ext uri="{FF2B5EF4-FFF2-40B4-BE49-F238E27FC236}">
+                  <a16:creationId xmlns:a16="http://schemas.microsoft.com/office/drawing/2014/main" id="{ED9430C5-12BA-2F4F-BE07-ECF4E6174D74}"/>
+                </a:ext>
+              </a:extLst>
+            </p:cNvPr>
+            <p:cNvPicPr>
+              <a:picLocks noChangeAspect="1"/>
+            </p:cNvPicPr>
+            <p:nvPr/>
+          </p:nvPicPr>
+          <p:blipFill>
+            <a:blip r:embed="rId5"/>
+            <a:stretch>
+              <a:fillRect/>
+            </a:stretch>
+          </p:blipFill>
+          <p:spPr>
+            <a:xfrm>
+              <a:off x="6175592" y="1218216"/>
+              <a:ext cx="3822700" cy="1511300"/>
+            </a:xfrm>
+            <a:prstGeom prst="rect">
+              <a:avLst/>
+            </a:prstGeom>
+          </p:spPr>
+        </p:pic>
+      </p:grpSp>
+      <p:sp>
+        <p:nvSpPr>
+          <p:cNvPr id="9" name="ZoneTexte 8">
+            <a:extLst>
+              <a:ext uri="{FF2B5EF4-FFF2-40B4-BE49-F238E27FC236}">
+                <a16:creationId xmlns:a16="http://schemas.microsoft.com/office/drawing/2014/main" id="{729F2613-7188-63C9-8F70-6088902B2977}"/>
+              </a:ext>
+            </a:extLst>
+          </p:cNvPr>
+          <p:cNvSpPr txBox="1"/>
+          <p:nvPr/>
+        </p:nvSpPr>
         <p:spPr>
           <a:xfrm>
-            <a:off x="930477" y="3906070"/>
-            <a:ext cx="3098800" cy="1917700"/>
+            <a:off x="607897" y="4824717"/>
+            <a:ext cx="11286636" cy="1323439"/>
           </a:xfrm>
           <a:prstGeom prst="rect">
             <a:avLst/>
           </a:prstGeom>
+          <a:noFill/>
         </p:spPr>
-      </p:pic>
-      <p:pic>
-        <p:nvPicPr>
-          <p:cNvPr id="23" name="Image 22" descr="Une image contenant texte, Police, capture d’écran&#10;&#10;Description générée automatiquement">
-            <a:extLst>
-              <a:ext uri="{FF2B5EF4-FFF2-40B4-BE49-F238E27FC236}">
-                <a16:creationId xmlns:a16="http://schemas.microsoft.com/office/drawing/2014/main" id="{76069E87-9F61-D3C9-1D55-C506F5C1F2B8}"/>
-              </a:ext>
-            </a:extLst>
-          </p:cNvPr>
-          <p:cNvPicPr>
-            <a:picLocks noChangeAspect="1"/>
-          </p:cNvPicPr>
-          <p:nvPr/>
-        </p:nvPicPr>
-        <p:blipFill>
-          <a:blip r:embed="rId4"/>
-          <a:stretch>
-            <a:fillRect/>
-          </a:stretch>
-        </p:blipFill>
-        <p:spPr>
-          <a:xfrm>
-            <a:off x="7700812" y="4019342"/>
-            <a:ext cx="3314700" cy="1917700"/>
-          </a:xfrm>
-          <a:prstGeom prst="rect">
-            <a:avLst/>
-          </a:prstGeom>
-        </p:spPr>
-      </p:pic>
-      <p:sp>
-        <p:nvSpPr>
-          <p:cNvPr id="24" name="Flèche vers la droite 23">
-            <a:extLst>
-              <a:ext uri="{FF2B5EF4-FFF2-40B4-BE49-F238E27FC236}">
-                <a16:creationId xmlns:a16="http://schemas.microsoft.com/office/drawing/2014/main" id="{2DAA639B-8AEC-2BF3-8CD3-B99AF32098A3}"/>
-              </a:ext>
-            </a:extLst>
-          </p:cNvPr>
-          <p:cNvSpPr/>
-          <p:nvPr/>
-        </p:nvSpPr>
-        <p:spPr>
-          <a:xfrm>
-            <a:off x="4184611" y="4702477"/>
-            <a:ext cx="3316778" cy="551431"/>
-          </a:xfrm>
-          <a:prstGeom prst="rightArrow">
-            <a:avLst/>
-          </a:prstGeom>
-        </p:spPr>
-        <p:style>
-          <a:lnRef idx="2">
-            <a:schemeClr val="accent2">
-              <a:shade val="15000"/>
-            </a:schemeClr>
-          </a:lnRef>
-          <a:fillRef idx="1">
-            <a:schemeClr val="accent2"/>
-          </a:fillRef>
-          <a:effectRef idx="0">
-            <a:schemeClr val="accent2"/>
-          </a:effectRef>
-          <a:fontRef idx="minor">
-            <a:schemeClr val="lt1"/>
-          </a:fontRef>
-        </p:style>
-        <p:txBody>
-          <a:bodyPr rtlCol="0" anchor="ctr"/>
-          <a:lstStyle/>
-          <a:p>
-            <a:pPr algn="ctr"/>
-            <a:r>
-              <a:rPr lang="fr-FR" dirty="0">
-                <a:latin typeface="Times New Roman" panose="02020603050405020304" pitchFamily="18" charset="0"/>
-                <a:cs typeface="Times New Roman" panose="02020603050405020304" pitchFamily="18" charset="0"/>
-              </a:rPr>
-              <a:t>Est équivalent à</a:t>
-            </a:r>
-          </a:p>
-        </p:txBody>
-      </p:sp>
-      <p:pic>
-        <p:nvPicPr>
-          <p:cNvPr id="27" name="Image 26" descr="Une image contenant texte, Police, capture d’écran&#10;&#10;Description générée automatiquement">
-            <a:extLst>
-              <a:ext uri="{FF2B5EF4-FFF2-40B4-BE49-F238E27FC236}">
-                <a16:creationId xmlns:a16="http://schemas.microsoft.com/office/drawing/2014/main" id="{ED9430C5-12BA-2F4F-BE07-ECF4E6174D74}"/>
-              </a:ext>
-            </a:extLst>
-          </p:cNvPr>
-          <p:cNvPicPr>
-            <a:picLocks noChangeAspect="1"/>
-          </p:cNvPicPr>
-          <p:nvPr/>
-        </p:nvPicPr>
-        <p:blipFill>
-          <a:blip r:embed="rId5"/>
-          <a:stretch>
-            <a:fillRect/>
-          </a:stretch>
-        </p:blipFill>
-        <p:spPr>
-          <a:xfrm>
-            <a:off x="6242628" y="1437319"/>
-            <a:ext cx="3822700" cy="1511300"/>
-          </a:xfrm>
-          <a:prstGeom prst="rect">
-            <a:avLst/>
-          </a:prstGeom>
-        </p:spPr>
-      </p:pic>
+        <p:txBody>
+          <a:bodyPr wrap="square" rtlCol="0">
+            <a:spAutoFit/>
+          </a:bodyPr>
+          <a:lstStyle/>
+          <a:p>
+            <a:r>
+              <a:rPr lang="fr-FR" sz="2000" dirty="0">
+                <a:latin typeface="Times New Roman" panose="02020603050405020304" pitchFamily="18" charset="0"/>
+                <a:cs typeface="Times New Roman" panose="02020603050405020304" pitchFamily="18" charset="0"/>
+              </a:rPr>
+              <a:t>Il faut noter les points suivants:</a:t>
+            </a:r>
+          </a:p>
+          <a:p>
+            <a:pPr marL="342900" indent="-342900">
+              <a:buFont typeface="Arial" panose="020B0604020202020204" pitchFamily="34" charset="0"/>
+              <a:buChar char="•"/>
+            </a:pPr>
+            <a:r>
+              <a:rPr lang="fr-FR" sz="2000" dirty="0">
+                <a:latin typeface="Times New Roman" panose="02020603050405020304" pitchFamily="18" charset="0"/>
+                <a:cs typeface="Times New Roman" panose="02020603050405020304" pitchFamily="18" charset="0"/>
+              </a:rPr>
+              <a:t>Il n’y a jamais de </a:t>
+            </a:r>
+            <a:r>
+              <a:rPr lang="fr-FR" sz="2000" b="1" dirty="0" err="1">
+                <a:latin typeface="Times New Roman" panose="02020603050405020304" pitchFamily="18" charset="0"/>
+                <a:cs typeface="Times New Roman" panose="02020603050405020304" pitchFamily="18" charset="0"/>
+              </a:rPr>
+              <a:t>elif</a:t>
+            </a:r>
+            <a:r>
+              <a:rPr lang="fr-FR" sz="2000" b="1" dirty="0">
+                <a:latin typeface="Times New Roman" panose="02020603050405020304" pitchFamily="18" charset="0"/>
+                <a:cs typeface="Times New Roman" panose="02020603050405020304" pitchFamily="18" charset="0"/>
+              </a:rPr>
+              <a:t> </a:t>
+            </a:r>
+            <a:r>
+              <a:rPr lang="fr-FR" sz="2000" dirty="0">
+                <a:latin typeface="Times New Roman" panose="02020603050405020304" pitchFamily="18" charset="0"/>
+                <a:cs typeface="Times New Roman" panose="02020603050405020304" pitchFamily="18" charset="0"/>
+              </a:rPr>
+              <a:t>sans </a:t>
+            </a:r>
+            <a:r>
+              <a:rPr lang="fr-FR" sz="2000" b="1" dirty="0">
+                <a:latin typeface="Times New Roman" panose="02020603050405020304" pitchFamily="18" charset="0"/>
+                <a:cs typeface="Times New Roman" panose="02020603050405020304" pitchFamily="18" charset="0"/>
+              </a:rPr>
+              <a:t>if (test avec alternative)</a:t>
+            </a:r>
+          </a:p>
+          <a:p>
+            <a:pPr marL="342900" indent="-342900">
+              <a:buFont typeface="Arial" panose="020B0604020202020204" pitchFamily="34" charset="0"/>
+              <a:buChar char="•"/>
+            </a:pPr>
+            <a:r>
+              <a:rPr lang="fr-FR" sz="2000" dirty="0">
+                <a:latin typeface="Times New Roman" panose="02020603050405020304" pitchFamily="18" charset="0"/>
+                <a:cs typeface="Times New Roman" panose="02020603050405020304" pitchFamily="18" charset="0"/>
+              </a:rPr>
+              <a:t>Il n’y a jamais de </a:t>
+            </a:r>
+            <a:r>
+              <a:rPr lang="fr-FR" sz="2000" b="1" dirty="0" err="1">
+                <a:latin typeface="Times New Roman" panose="02020603050405020304" pitchFamily="18" charset="0"/>
+                <a:cs typeface="Times New Roman" panose="02020603050405020304" pitchFamily="18" charset="0"/>
+              </a:rPr>
+              <a:t>else</a:t>
+            </a:r>
+            <a:r>
+              <a:rPr lang="fr-FR" sz="2000" b="1" dirty="0">
+                <a:latin typeface="Times New Roman" panose="02020603050405020304" pitchFamily="18" charset="0"/>
+                <a:cs typeface="Times New Roman" panose="02020603050405020304" pitchFamily="18" charset="0"/>
+              </a:rPr>
+              <a:t> </a:t>
+            </a:r>
+            <a:r>
+              <a:rPr lang="fr-FR" sz="2000" dirty="0">
+                <a:latin typeface="Times New Roman" panose="02020603050405020304" pitchFamily="18" charset="0"/>
+                <a:cs typeface="Times New Roman" panose="02020603050405020304" pitchFamily="18" charset="0"/>
+              </a:rPr>
+              <a:t>sans </a:t>
+            </a:r>
+            <a:r>
+              <a:rPr lang="fr-FR" sz="2000" b="1" dirty="0">
+                <a:latin typeface="Times New Roman" panose="02020603050405020304" pitchFamily="18" charset="0"/>
+                <a:cs typeface="Times New Roman" panose="02020603050405020304" pitchFamily="18" charset="0"/>
+              </a:rPr>
+              <a:t>if (test avec alternative)</a:t>
+            </a:r>
+          </a:p>
+          <a:p>
+            <a:pPr marL="342900" indent="-342900">
+              <a:buFont typeface="Arial" panose="020B0604020202020204" pitchFamily="34" charset="0"/>
+              <a:buChar char="•"/>
+            </a:pPr>
+            <a:r>
+              <a:rPr lang="fr-FR" sz="2000" dirty="0">
+                <a:latin typeface="Times New Roman" panose="02020603050405020304" pitchFamily="18" charset="0"/>
+                <a:cs typeface="Times New Roman" panose="02020603050405020304" pitchFamily="18" charset="0"/>
+              </a:rPr>
+              <a:t>Il peut y avoir un </a:t>
+            </a:r>
+            <a:r>
+              <a:rPr lang="fr-FR" sz="2000" b="1" dirty="0">
+                <a:latin typeface="Times New Roman" panose="02020603050405020304" pitchFamily="18" charset="0"/>
+                <a:cs typeface="Times New Roman" panose="02020603050405020304" pitchFamily="18" charset="0"/>
+              </a:rPr>
+              <a:t>if </a:t>
+            </a:r>
+            <a:r>
+              <a:rPr lang="fr-FR" sz="2000" dirty="0">
+                <a:latin typeface="Times New Roman" panose="02020603050405020304" pitchFamily="18" charset="0"/>
+                <a:cs typeface="Times New Roman" panose="02020603050405020304" pitchFamily="18" charset="0"/>
+              </a:rPr>
+              <a:t>sans </a:t>
+            </a:r>
+            <a:r>
+              <a:rPr lang="fr-FR" sz="2000" b="1" dirty="0" err="1">
+                <a:latin typeface="Times New Roman" panose="02020603050405020304" pitchFamily="18" charset="0"/>
+                <a:cs typeface="Times New Roman" panose="02020603050405020304" pitchFamily="18" charset="0"/>
+              </a:rPr>
+              <a:t>else</a:t>
+            </a:r>
+            <a:r>
+              <a:rPr lang="fr-FR" sz="2000" b="1" dirty="0">
+                <a:latin typeface="Times New Roman" panose="02020603050405020304" pitchFamily="18" charset="0"/>
+                <a:cs typeface="Times New Roman" panose="02020603050405020304" pitchFamily="18" charset="0"/>
+              </a:rPr>
+              <a:t> ou </a:t>
+            </a:r>
+            <a:r>
+              <a:rPr lang="fr-FR" sz="2000" b="1" dirty="0" err="1">
+                <a:latin typeface="Times New Roman" panose="02020603050405020304" pitchFamily="18" charset="0"/>
+                <a:cs typeface="Times New Roman" panose="02020603050405020304" pitchFamily="18" charset="0"/>
+              </a:rPr>
+              <a:t>elif</a:t>
+            </a:r>
+            <a:r>
+              <a:rPr lang="fr-FR" sz="2000" b="1" dirty="0">
+                <a:latin typeface="Times New Roman" panose="02020603050405020304" pitchFamily="18" charset="0"/>
+                <a:cs typeface="Times New Roman" panose="02020603050405020304" pitchFamily="18" charset="0"/>
+              </a:rPr>
+              <a:t> (test sans alternative)</a:t>
+            </a:r>
+          </a:p>
+        </p:txBody>
+      </p:sp>
     </p:spTree>
     <p:extLst>
       <p:ext uri="{BB962C8B-B14F-4D97-AF65-F5344CB8AC3E}">
@@ -11241,14 +11694,14 @@
           <p:nvPr>
             <p:extLst>
               <p:ext uri="{D42A27DB-BD31-4B8C-83A1-F6EECF244321}">
-                <p14:modId xmlns:p14="http://schemas.microsoft.com/office/powerpoint/2010/main" val="1332428957"/>
+                <p14:modId xmlns:p14="http://schemas.microsoft.com/office/powerpoint/2010/main" val="97960015"/>
               </p:ext>
             </p:extLst>
           </p:nvPr>
         </p:nvGraphicFramePr>
         <p:xfrm>
-          <a:off x="2949106" y="1129543"/>
-          <a:ext cx="4491672" cy="1584960"/>
+          <a:off x="2939679" y="1046512"/>
+          <a:ext cx="4491672" cy="1981200"/>
         </p:xfrm>
         <a:graphic>
           <a:graphicData uri="http://schemas.openxmlformats.org/drawingml/2006/table">
@@ -11423,7 +11876,7 @@
                           <a:latin typeface="Times New Roman" panose="02020603050405020304" pitchFamily="18" charset="0"/>
                           <a:cs typeface="Times New Roman" panose="02020603050405020304" pitchFamily="18" charset="0"/>
                         </a:rPr>
-                        <a:t>non</a:t>
+                        <a:t>Non</a:t>
                       </a:r>
                     </a:p>
                   </a:txBody>
@@ -11435,6 +11888,49 @@
                   </a:ext>
                 </a:extLst>
               </a:tr>
+              <a:tr h="370840">
+                <a:tc>
+                  <a:txBody>
+                    <a:bodyPr/>
+                    <a:lstStyle/>
+                    <a:p>
+                      <a:r>
+                        <a:rPr lang="fr-FR" sz="2000" dirty="0" err="1">
+                          <a:latin typeface="Times New Roman" panose="02020603050405020304" pitchFamily="18" charset="0"/>
+                          <a:cs typeface="Times New Roman" panose="02020603050405020304" pitchFamily="18" charset="0"/>
+                        </a:rPr>
+                        <a:t>is</a:t>
+                      </a:r>
+                      <a:endParaRPr lang="fr-FR" sz="2000" dirty="0">
+                        <a:latin typeface="Times New Roman" panose="02020603050405020304" pitchFamily="18" charset="0"/>
+                        <a:cs typeface="Times New Roman" panose="02020603050405020304" pitchFamily="18" charset="0"/>
+                      </a:endParaRPr>
+                    </a:p>
+                  </a:txBody>
+                  <a:tcPr/>
+                </a:tc>
+                <a:tc>
+                  <a:txBody>
+                    <a:bodyPr/>
+                    <a:lstStyle/>
+                    <a:p>
+                      <a:r>
+                        <a:rPr lang="fr-FR" sz="2000" dirty="0">
+                          <a:latin typeface="Times New Roman" panose="02020603050405020304" pitchFamily="18" charset="0"/>
+                          <a:cs typeface="Times New Roman" panose="02020603050405020304" pitchFamily="18" charset="0"/>
+                        </a:rPr>
+                        <a:t>Est égal</a:t>
+                      </a:r>
+                    </a:p>
+                  </a:txBody>
+                  <a:tcPr/>
+                </a:tc>
+                <a:extLst>
+                  <a:ext uri="{0D108BD9-81ED-4DB2-BD59-A6C34878D82A}">
+                    <a16:rowId xmlns:a16="http://schemas.microsoft.com/office/drawing/2014/main" val="1357503858"/>
+                  </a:ext>
+                </a:extLst>
+              </a:tr>
             </a:tbl>
           </a:graphicData>
         </a:graphic>
@@ -11453,7 +11949,7 @@
         </p:nvSpPr>
         <p:spPr>
           <a:xfrm>
-            <a:off x="397565" y="2834065"/>
+            <a:off x="397565" y="3061449"/>
             <a:ext cx="11286636" cy="400110"/>
           </a:xfrm>
           <a:prstGeom prst="rect">
@@ -11520,7 +12016,7 @@
         </p:blipFill>
         <p:spPr>
           <a:xfrm>
-            <a:off x="2846386" y="3234175"/>
+            <a:off x="2846386" y="3546895"/>
             <a:ext cx="4457700" cy="2082800"/>
           </a:xfrm>
           <a:prstGeom prst="rect">
@@ -11542,7 +12038,7 @@
         </p:nvSpPr>
         <p:spPr>
           <a:xfrm>
-            <a:off x="500932" y="5469923"/>
+            <a:off x="500932" y="5545782"/>
             <a:ext cx="11286636" cy="707886"/>
           </a:xfrm>
           <a:prstGeom prst="rect">

</xml_diff>

<commit_message>
Chore(chp3): Ajout de note sur la nuance des id
Ajout de la nuance entre != et is not et == et is
</commit_message>
<xml_diff>
--- a/source/Chapitre 3 - Structures conditionnelles.pptx
+++ b/source/Chapitre 3 - Structures conditionnelles.pptx
@@ -130,7 +130,7 @@
 <file path=ppt/revisionInfo.xml><?xml version="1.0" encoding="utf-8"?>
 <p1510:revInfo xmlns:a="http://schemas.openxmlformats.org/drawingml/2006/main" xmlns:r="http://schemas.openxmlformats.org/officeDocument/2006/relationships" xmlns:p1510="http://schemas.microsoft.com/office/powerpoint/2015/10/main">
   <p1510:revLst>
-    <p1510:client id="{4E0E620D-09F9-4BE3-9F03-2E2526FB828A}" v="5" dt="2024-02-11T14:05:41.734"/>
+    <p1510:client id="{4E0E620D-09F9-4BE3-9F03-2E2526FB828A}" v="8" dt="2024-02-18T14:14:26.962"/>
   </p1510:revLst>
 </p1510:revInfo>
 </file>
@@ -1422,7 +1422,7 @@
   <pc:docChgLst>
     <pc:chgData name="Ismaël Tuo" userId="fca7baf0e513a1e6" providerId="LiveId" clId="{4E0E620D-09F9-4BE3-9F03-2E2526FB828A}"/>
     <pc:docChg chg="undo custSel addSld delSld modSld">
-      <pc:chgData name="Ismaël Tuo" userId="fca7baf0e513a1e6" providerId="LiveId" clId="{4E0E620D-09F9-4BE3-9F03-2E2526FB828A}" dt="2024-02-11T14:09:55.018" v="328" actId="20577"/>
+      <pc:chgData name="Ismaël Tuo" userId="fca7baf0e513a1e6" providerId="LiveId" clId="{4E0E620D-09F9-4BE3-9F03-2E2526FB828A}" dt="2024-02-18T14:14:26.962" v="587"/>
       <pc:docMkLst>
         <pc:docMk/>
       </pc:docMkLst>
@@ -1699,14 +1699,14 @@
           </ac:spMkLst>
         </pc:spChg>
       </pc:sldChg>
-      <pc:sldChg chg="modSp mod">
-        <pc:chgData name="Ismaël Tuo" userId="fca7baf0e513a1e6" providerId="LiveId" clId="{4E0E620D-09F9-4BE3-9F03-2E2526FB828A}" dt="2024-02-11T14:09:55.018" v="328" actId="20577"/>
+      <pc:sldChg chg="addSp modSp mod">
+        <pc:chgData name="Ismaël Tuo" userId="fca7baf0e513a1e6" providerId="LiveId" clId="{4E0E620D-09F9-4BE3-9F03-2E2526FB828A}" dt="2024-02-18T14:14:26.962" v="587"/>
         <pc:sldMkLst>
           <pc:docMk/>
           <pc:sldMk cId="2521371462" sldId="292"/>
         </pc:sldMkLst>
         <pc:spChg chg="mod">
-          <ac:chgData name="Ismaël Tuo" userId="fca7baf0e513a1e6" providerId="LiveId" clId="{4E0E620D-09F9-4BE3-9F03-2E2526FB828A}" dt="2024-02-11T14:09:50.750" v="326" actId="1076"/>
+          <ac:chgData name="Ismaël Tuo" userId="fca7baf0e513a1e6" providerId="LiveId" clId="{4E0E620D-09F9-4BE3-9F03-2E2526FB828A}" dt="2024-02-18T14:13:18.034" v="406" actId="1076"/>
           <ac:spMkLst>
             <pc:docMk/>
             <pc:sldMk cId="2521371462" sldId="292"/>
@@ -1721,8 +1721,16 @@
             <ac:spMk id="6" creationId="{84F10693-2FE8-EFC8-8DB6-84BFD181D260}"/>
           </ac:spMkLst>
         </pc:spChg>
+        <pc:spChg chg="add mod">
+          <ac:chgData name="Ismaël Tuo" userId="fca7baf0e513a1e6" providerId="LiveId" clId="{4E0E620D-09F9-4BE3-9F03-2E2526FB828A}" dt="2024-02-18T14:14:26.962" v="587"/>
+          <ac:spMkLst>
+            <pc:docMk/>
+            <pc:sldMk cId="2521371462" sldId="292"/>
+            <ac:spMk id="7" creationId="{1F1E01FF-2514-0859-0EA2-6BCF5ED0A20E}"/>
+          </ac:spMkLst>
+        </pc:spChg>
         <pc:spChg chg="mod">
-          <ac:chgData name="Ismaël Tuo" userId="fca7baf0e513a1e6" providerId="LiveId" clId="{4E0E620D-09F9-4BE3-9F03-2E2526FB828A}" dt="2024-02-11T14:09:46.107" v="324" actId="1076"/>
+          <ac:chgData name="Ismaël Tuo" userId="fca7baf0e513a1e6" providerId="LiveId" clId="{4E0E620D-09F9-4BE3-9F03-2E2526FB828A}" dt="2024-02-18T14:13:12.340" v="404" actId="1076"/>
           <ac:spMkLst>
             <pc:docMk/>
             <pc:sldMk cId="2521371462" sldId="292"/>
@@ -1730,7 +1738,7 @@
           </ac:spMkLst>
         </pc:spChg>
         <pc:graphicFrameChg chg="mod modGraphic">
-          <ac:chgData name="Ismaël Tuo" userId="fca7baf0e513a1e6" providerId="LiveId" clId="{4E0E620D-09F9-4BE3-9F03-2E2526FB828A}" dt="2024-02-11T14:09:55.018" v="328" actId="20577"/>
+          <ac:chgData name="Ismaël Tuo" userId="fca7baf0e513a1e6" providerId="LiveId" clId="{4E0E620D-09F9-4BE3-9F03-2E2526FB828A}" dt="2024-02-18T14:12:51.371" v="398" actId="20577"/>
           <ac:graphicFrameMkLst>
             <pc:docMk/>
             <pc:sldMk cId="2521371462" sldId="292"/>
@@ -1738,7 +1746,7 @@
           </ac:graphicFrameMkLst>
         </pc:graphicFrameChg>
         <pc:picChg chg="mod">
-          <ac:chgData name="Ismaël Tuo" userId="fca7baf0e513a1e6" providerId="LiveId" clId="{4E0E620D-09F9-4BE3-9F03-2E2526FB828A}" dt="2024-02-11T14:09:47.323" v="325" actId="1076"/>
+          <ac:chgData name="Ismaël Tuo" userId="fca7baf0e513a1e6" providerId="LiveId" clId="{4E0E620D-09F9-4BE3-9F03-2E2526FB828A}" dt="2024-02-18T14:13:15.071" v="405" actId="1076"/>
           <ac:picMkLst>
             <pc:docMk/>
             <pc:sldMk cId="2521371462" sldId="292"/>
@@ -1997,7 +2005,7 @@
           <a:p>
             <a:fld id="{5D1B8971-FAD5-A544-A565-5C81831E2E08}" type="datetimeFigureOut">
               <a:rPr lang="fr-FR" smtClean="0"/>
-              <a:t>11/02/2024</a:t>
+              <a:t>18/02/2024</a:t>
             </a:fld>
             <a:endParaRPr lang="fr-FR"/>
           </a:p>
@@ -2847,7 +2855,7 @@
           <a:p>
             <a:fld id="{446AF453-C717-E044-9B61-C449088DBB9F}" type="datetime1">
               <a:rPr lang="fr-FR" smtClean="0"/>
-              <a:t>11/02/2024</a:t>
+              <a:t>18/02/2024</a:t>
             </a:fld>
             <a:endParaRPr lang="fr-FR"/>
           </a:p>
@@ -3021,7 +3029,7 @@
           <a:p>
             <a:fld id="{0AD74B8B-4B66-A54B-A7E1-EB9F6C09CE67}" type="datetime1">
               <a:rPr lang="fr-FR" smtClean="0"/>
-              <a:t>11/02/2024</a:t>
+              <a:t>18/02/2024</a:t>
             </a:fld>
             <a:endParaRPr lang="fr-FR"/>
           </a:p>
@@ -3205,7 +3213,7 @@
           <a:p>
             <a:fld id="{9584F9F2-42A0-CD42-8013-986AEAF97421}" type="datetime1">
               <a:rPr lang="fr-FR" smtClean="0"/>
-              <a:t>11/02/2024</a:t>
+              <a:t>18/02/2024</a:t>
             </a:fld>
             <a:endParaRPr lang="fr-FR"/>
           </a:p>
@@ -3379,7 +3387,7 @@
           <a:p>
             <a:fld id="{DAB9BD9F-3179-BB4C-96AB-C40862581685}" type="datetime1">
               <a:rPr lang="fr-FR" smtClean="0"/>
-              <a:t>11/02/2024</a:t>
+              <a:t>18/02/2024</a:t>
             </a:fld>
             <a:endParaRPr lang="fr-FR"/>
           </a:p>
@@ -3651,7 +3659,7 @@
           <a:p>
             <a:fld id="{A664DE96-64FF-BC43-8A9C-18ED43A528D6}" type="datetime1">
               <a:rPr lang="fr-FR" smtClean="0"/>
-              <a:t>11/02/2024</a:t>
+              <a:t>18/02/2024</a:t>
             </a:fld>
             <a:endParaRPr lang="fr-FR"/>
           </a:p>
@@ -3887,7 +3895,7 @@
           <a:p>
             <a:fld id="{2C8FE800-9F9B-1C4F-A1CD-9EF46842C4CA}" type="datetime1">
               <a:rPr lang="fr-FR" smtClean="0"/>
-              <a:t>11/02/2024</a:t>
+              <a:t>18/02/2024</a:t>
             </a:fld>
             <a:endParaRPr lang="fr-FR"/>
           </a:p>
@@ -4250,7 +4258,7 @@
           <a:p>
             <a:fld id="{0F7DED4E-8CB4-EF40-A349-EFC02EC7784E}" type="datetime1">
               <a:rPr lang="fr-FR" smtClean="0"/>
-              <a:t>11/02/2024</a:t>
+              <a:t>18/02/2024</a:t>
             </a:fld>
             <a:endParaRPr lang="fr-FR"/>
           </a:p>
@@ -4395,7 +4403,7 @@
           <a:p>
             <a:fld id="{5BB88D77-E8A2-E24F-81D2-817E60779F3E}" type="datetime1">
               <a:rPr lang="fr-FR" smtClean="0"/>
-              <a:t>11/02/2024</a:t>
+              <a:t>18/02/2024</a:t>
             </a:fld>
             <a:endParaRPr lang="fr-FR"/>
           </a:p>
@@ -4494,7 +4502,7 @@
           <a:p>
             <a:fld id="{817F964E-5B57-884A-A1B8-925BFA5276AF}" type="datetime1">
               <a:rPr lang="fr-FR" smtClean="0"/>
-              <a:t>11/02/2024</a:t>
+              <a:t>18/02/2024</a:t>
             </a:fld>
             <a:endParaRPr lang="fr-FR"/>
           </a:p>
@@ -4855,7 +4863,7 @@
           <a:p>
             <a:fld id="{D5636CD0-A2E6-1543-A0E5-C829C16FEE55}" type="datetime1">
               <a:rPr lang="fr-FR" smtClean="0"/>
-              <a:t>11/02/2024</a:t>
+              <a:t>18/02/2024</a:t>
             </a:fld>
             <a:endParaRPr lang="fr-FR"/>
           </a:p>
@@ -5216,7 +5224,7 @@
           <a:p>
             <a:fld id="{CEE5CE4A-5B1A-1846-BA66-722BDB7A9525}" type="datetime1">
               <a:rPr lang="fr-FR" smtClean="0"/>
-              <a:t>11/02/2024</a:t>
+              <a:t>18/02/2024</a:t>
             </a:fld>
             <a:endParaRPr lang="fr-FR"/>
           </a:p>
@@ -5463,7 +5471,7 @@
           <a:p>
             <a:fld id="{55A13D9C-CA6E-9C45-8634-4423EBFFD553}" type="datetime1">
               <a:rPr lang="fr-FR" smtClean="0"/>
-              <a:t>11/02/2024</a:t>
+              <a:t>18/02/2024</a:t>
             </a:fld>
             <a:endParaRPr lang="fr-FR"/>
           </a:p>
@@ -11694,7 +11702,7 @@
           <p:nvPr>
             <p:extLst>
               <p:ext uri="{D42A27DB-BD31-4B8C-83A1-F6EECF244321}">
-                <p14:modId xmlns:p14="http://schemas.microsoft.com/office/powerpoint/2010/main" val="97960015"/>
+                <p14:modId xmlns:p14="http://schemas.microsoft.com/office/powerpoint/2010/main" val="1659988391"/>
               </p:ext>
             </p:extLst>
           </p:nvPr>
@@ -11949,7 +11957,7 @@
         </p:nvSpPr>
         <p:spPr>
           <a:xfrm>
-            <a:off x="397565" y="3061449"/>
+            <a:off x="319248" y="3714961"/>
             <a:ext cx="11286636" cy="400110"/>
           </a:xfrm>
           <a:prstGeom prst="rect">
@@ -12016,8 +12024,8 @@
         </p:blipFill>
         <p:spPr>
           <a:xfrm>
-            <a:off x="2846386" y="3546895"/>
-            <a:ext cx="4457700" cy="2082800"/>
+            <a:off x="2846386" y="4097223"/>
+            <a:ext cx="4457700" cy="1628063"/>
           </a:xfrm>
           <a:prstGeom prst="rect">
             <a:avLst/>
@@ -12038,8 +12046,8 @@
         </p:nvSpPr>
         <p:spPr>
           <a:xfrm>
-            <a:off x="500932" y="5545782"/>
-            <a:ext cx="11286636" cy="707886"/>
+            <a:off x="84473" y="5602541"/>
+            <a:ext cx="12545112" cy="707886"/>
           </a:xfrm>
           <a:prstGeom prst="rect">
             <a:avLst/>
@@ -12062,6 +12070,149 @@
           </a:p>
         </p:txBody>
       </p:sp>
+      <mc:AlternateContent xmlns:mc="http://schemas.openxmlformats.org/markup-compatibility/2006">
+        <mc:Choice xmlns:a14="http://schemas.microsoft.com/office/drawing/2010/main" Requires="a14">
+          <p:sp>
+            <p:nvSpPr>
+              <p:cNvPr id="7" name="ZoneTexte 6">
+                <a:extLst>
+                  <a:ext uri="{FF2B5EF4-FFF2-40B4-BE49-F238E27FC236}">
+                    <a16:creationId xmlns:a16="http://schemas.microsoft.com/office/drawing/2014/main" id="{1F1E01FF-2514-0859-0EA2-6BCF5ED0A20E}"/>
+                  </a:ext>
+                </a:extLst>
+              </p:cNvPr>
+              <p:cNvSpPr txBox="1"/>
+              <p:nvPr/>
+            </p:nvSpPr>
+            <p:spPr>
+              <a:xfrm>
+                <a:off x="84473" y="3027379"/>
+                <a:ext cx="11286636" cy="707886"/>
+              </a:xfrm>
+              <a:prstGeom prst="rect">
+                <a:avLst/>
+              </a:prstGeom>
+              <a:noFill/>
+            </p:spPr>
+            <p:txBody>
+              <a:bodyPr wrap="square" rtlCol="0">
+                <a:spAutoFit/>
+              </a:bodyPr>
+              <a:lstStyle/>
+              <a:p>
+                <a:r>
+                  <a:rPr lang="fr-FR" sz="2000" b="1" dirty="0">
+                    <a:latin typeface="Times New Roman" panose="02020603050405020304" pitchFamily="18" charset="0"/>
+                    <a:cs typeface="Times New Roman" panose="02020603050405020304" pitchFamily="18" charset="0"/>
+                  </a:rPr>
+                  <a:t>Le </a:t>
+                </a:r>
+                <a14:m>
+                  <m:oMath xmlns:m="http://schemas.openxmlformats.org/officeDocument/2006/math">
+                    <m:r>
+                      <a:rPr lang="fr-FR" sz="2000" b="1" i="1" dirty="0" smtClean="0">
+                        <a:latin typeface="Cambria Math" panose="02040503050406030204" pitchFamily="18" charset="0"/>
+                        <a:cs typeface="Times New Roman" panose="02020603050405020304" pitchFamily="18" charset="0"/>
+                      </a:rPr>
+                      <m:t>𝒊𝒔</m:t>
+                    </m:r>
+                  </m:oMath>
+                </a14:m>
+                <a:r>
+                  <a:rPr lang="fr-FR" sz="2000" b="1" dirty="0">
+                    <a:latin typeface="Times New Roman" panose="02020603050405020304" pitchFamily="18" charset="0"/>
+                    <a:cs typeface="Times New Roman" panose="02020603050405020304" pitchFamily="18" charset="0"/>
+                  </a:rPr>
+                  <a:t> et </a:t>
+                </a:r>
+                <a14:m>
+                  <m:oMath xmlns:m="http://schemas.openxmlformats.org/officeDocument/2006/math">
+                    <m:r>
+                      <a:rPr lang="fr-FR" sz="2000" b="1" i="1" dirty="0" smtClean="0">
+                        <a:latin typeface="Cambria Math" panose="02040503050406030204" pitchFamily="18" charset="0"/>
+                        <a:cs typeface="Times New Roman" panose="02020603050405020304" pitchFamily="18" charset="0"/>
+                      </a:rPr>
+                      <m:t>𝒊𝒔</m:t>
+                    </m:r>
+                    <m:r>
+                      <a:rPr lang="fr-FR" sz="2000" b="1" i="1" dirty="0" smtClean="0">
+                        <a:latin typeface="Cambria Math" panose="02040503050406030204" pitchFamily="18" charset="0"/>
+                        <a:cs typeface="Times New Roman" panose="02020603050405020304" pitchFamily="18" charset="0"/>
+                      </a:rPr>
+                      <m:t> </m:t>
+                    </m:r>
+                    <m:r>
+                      <a:rPr lang="fr-FR" sz="2000" b="1" i="1" dirty="0" smtClean="0">
+                        <a:latin typeface="Cambria Math" panose="02040503050406030204" pitchFamily="18" charset="0"/>
+                        <a:cs typeface="Times New Roman" panose="02020603050405020304" pitchFamily="18" charset="0"/>
+                      </a:rPr>
+                      <m:t>𝒏𝒐𝒕</m:t>
+                    </m:r>
+                    <m:r>
+                      <a:rPr lang="fr-FR" sz="2000" b="1" i="1" dirty="0" smtClean="0">
+                        <a:latin typeface="Cambria Math" panose="02040503050406030204" pitchFamily="18" charset="0"/>
+                        <a:cs typeface="Times New Roman" panose="02020603050405020304" pitchFamily="18" charset="0"/>
+                      </a:rPr>
+                      <m:t> </m:t>
+                    </m:r>
+                  </m:oMath>
+                </a14:m>
+                <a:r>
+                  <a:rPr lang="fr-FR" sz="2000" b="1" dirty="0">
+                    <a:latin typeface="Times New Roman" panose="02020603050405020304" pitchFamily="18" charset="0"/>
+                    <a:cs typeface="Times New Roman" panose="02020603050405020304" pitchFamily="18" charset="0"/>
+                  </a:rPr>
+                  <a:t>doivent être utilisées aves précaution ne compare pas pareil avec les autres types d’objets comme les tableaux ou string….</a:t>
+                </a:r>
+              </a:p>
+            </p:txBody>
+          </p:sp>
+        </mc:Choice>
+        <mc:Fallback>
+          <p:sp>
+            <p:nvSpPr>
+              <p:cNvPr id="7" name="ZoneTexte 6">
+                <a:extLst>
+                  <a:ext uri="{FF2B5EF4-FFF2-40B4-BE49-F238E27FC236}">
+                    <a16:creationId xmlns:a16="http://schemas.microsoft.com/office/drawing/2014/main" id="{1F1E01FF-2514-0859-0EA2-6BCF5ED0A20E}"/>
+                  </a:ext>
+                </a:extLst>
+              </p:cNvPr>
+              <p:cNvSpPr txBox="1">
+                <a:spLocks noRot="1" noChangeAspect="1" noMove="1" noResize="1" noEditPoints="1" noAdjustHandles="1" noChangeArrowheads="1" noChangeShapeType="1" noTextEdit="1"/>
+              </p:cNvSpPr>
+              <p:nvPr/>
+            </p:nvSpPr>
+            <p:spPr>
+              <a:xfrm>
+                <a:off x="84473" y="3027379"/>
+                <a:ext cx="11286636" cy="707886"/>
+              </a:xfrm>
+              <a:prstGeom prst="rect">
+                <a:avLst/>
+              </a:prstGeom>
+              <a:blipFill>
+                <a:blip r:embed="rId4"/>
+                <a:stretch>
+                  <a:fillRect l="-594" t="-5172" b="-14655"/>
+                </a:stretch>
+              </a:blipFill>
+            </p:spPr>
+            <p:txBody>
+              <a:bodyPr/>
+              <a:lstStyle/>
+              <a:p>
+                <a:r>
+                  <a:rPr lang="fr-FR">
+                    <a:noFill/>
+                  </a:rPr>
+                  <a:t> </a:t>
+                </a:r>
+              </a:p>
+            </p:txBody>
+          </p:sp>
+        </mc:Fallback>
+      </mc:AlternateContent>
     </p:spTree>
     <p:extLst>
       <p:ext uri="{BB962C8B-B14F-4D97-AF65-F5344CB8AC3E}">

</xml_diff>

<commit_message>
Feat(chp8): Rédaction du chapitre 8
</commit_message>
<xml_diff>
--- a/source/Chapitre 3 - Structures conditionnelles.pptx
+++ b/source/Chapitre 3 - Structures conditionnelles.pptx
@@ -130,7 +130,7 @@
 <file path=ppt/revisionInfo.xml><?xml version="1.0" encoding="utf-8"?>
 <p1510:revInfo xmlns:a="http://schemas.openxmlformats.org/drawingml/2006/main" xmlns:r="http://schemas.openxmlformats.org/officeDocument/2006/relationships" xmlns:p1510="http://schemas.microsoft.com/office/powerpoint/2015/10/main">
   <p1510:revLst>
-    <p1510:client id="{4E0E620D-09F9-4BE3-9F03-2E2526FB828A}" v="8" dt="2024-02-18T14:14:26.962"/>
+    <p1510:client id="{4E0E620D-09F9-4BE3-9F03-2E2526FB828A}" v="17" dt="2024-02-18T17:53:36.567"/>
   </p1510:revLst>
 </p1510:revInfo>
 </file>
@@ -1422,7 +1422,7 @@
   <pc:docChgLst>
     <pc:chgData name="Ismaël Tuo" userId="fca7baf0e513a1e6" providerId="LiveId" clId="{4E0E620D-09F9-4BE3-9F03-2E2526FB828A}"/>
     <pc:docChg chg="undo custSel addSld delSld modSld">
-      <pc:chgData name="Ismaël Tuo" userId="fca7baf0e513a1e6" providerId="LiveId" clId="{4E0E620D-09F9-4BE3-9F03-2E2526FB828A}" dt="2024-02-18T14:14:26.962" v="587"/>
+      <pc:chgData name="Ismaël Tuo" userId="fca7baf0e513a1e6" providerId="LiveId" clId="{4E0E620D-09F9-4BE3-9F03-2E2526FB828A}" dt="2024-02-18T17:53:36.567" v="597" actId="20577"/>
       <pc:docMkLst>
         <pc:docMk/>
       </pc:docMkLst>
@@ -1700,7 +1700,7 @@
         </pc:spChg>
       </pc:sldChg>
       <pc:sldChg chg="addSp modSp mod">
-        <pc:chgData name="Ismaël Tuo" userId="fca7baf0e513a1e6" providerId="LiveId" clId="{4E0E620D-09F9-4BE3-9F03-2E2526FB828A}" dt="2024-02-18T14:14:26.962" v="587"/>
+        <pc:chgData name="Ismaël Tuo" userId="fca7baf0e513a1e6" providerId="LiveId" clId="{4E0E620D-09F9-4BE3-9F03-2E2526FB828A}" dt="2024-02-18T17:53:36.567" v="597" actId="20577"/>
         <pc:sldMkLst>
           <pc:docMk/>
           <pc:sldMk cId="2521371462" sldId="292"/>
@@ -1722,7 +1722,7 @@
           </ac:spMkLst>
         </pc:spChg>
         <pc:spChg chg="add mod">
-          <ac:chgData name="Ismaël Tuo" userId="fca7baf0e513a1e6" providerId="LiveId" clId="{4E0E620D-09F9-4BE3-9F03-2E2526FB828A}" dt="2024-02-18T14:14:26.962" v="587"/>
+          <ac:chgData name="Ismaël Tuo" userId="fca7baf0e513a1e6" providerId="LiveId" clId="{4E0E620D-09F9-4BE3-9F03-2E2526FB828A}" dt="2024-02-18T17:53:36.567" v="597" actId="20577"/>
           <ac:spMkLst>
             <pc:docMk/>
             <pc:sldMk cId="2521371462" sldId="292"/>
@@ -12086,8 +12086,8 @@
             </p:nvSpPr>
             <p:spPr>
               <a:xfrm>
-                <a:off x="84473" y="3027379"/>
-                <a:ext cx="11286636" cy="707886"/>
+                <a:off x="84472" y="3027379"/>
+                <a:ext cx="11788279" cy="707886"/>
               </a:xfrm>
               <a:prstGeom prst="rect">
                 <a:avLst/>
@@ -12162,8 +12162,19 @@
                     <a:latin typeface="Times New Roman" panose="02020603050405020304" pitchFamily="18" charset="0"/>
                     <a:cs typeface="Times New Roman" panose="02020603050405020304" pitchFamily="18" charset="0"/>
                   </a:rPr>
-                  <a:t>doivent être utilisées aves précaution ne compare pas pareil avec les autres types d’objets comme les tableaux ou string….</a:t>
+                  <a:t>doivent être utilisées aves précaution ne compare pas pareil avec les autres types comme les tableaux </a:t>
                 </a:r>
+                <a:r>
+                  <a:rPr lang="fr-FR" sz="2000" b="1">
+                    <a:latin typeface="Times New Roman" panose="02020603050405020304" pitchFamily="18" charset="0"/>
+                    <a:cs typeface="Times New Roman" panose="02020603050405020304" pitchFamily="18" charset="0"/>
+                  </a:rPr>
+                  <a:t>ou chaîne….</a:t>
+                </a:r>
+                <a:endParaRPr lang="fr-FR" sz="2000" b="1" dirty="0">
+                  <a:latin typeface="Times New Roman" panose="02020603050405020304" pitchFamily="18" charset="0"/>
+                  <a:cs typeface="Times New Roman" panose="02020603050405020304" pitchFamily="18" charset="0"/>
+                </a:endParaRPr>
               </a:p>
             </p:txBody>
           </p:sp>
@@ -12185,8 +12196,8 @@
             </p:nvSpPr>
             <p:spPr>
               <a:xfrm>
-                <a:off x="84473" y="3027379"/>
-                <a:ext cx="11286636" cy="707886"/>
+                <a:off x="84472" y="3027379"/>
+                <a:ext cx="11788279" cy="707886"/>
               </a:xfrm>
               <a:prstGeom prst="rect">
                 <a:avLst/>
@@ -12194,7 +12205,7 @@
               <a:blipFill>
                 <a:blip r:embed="rId4"/>
                 <a:stretch>
-                  <a:fillRect l="-594" t="-5172" b="-14655"/>
+                  <a:fillRect l="-569" t="-5172" b="-14655"/>
                 </a:stretch>
               </a:blipFill>
             </p:spPr>

</xml_diff>

<commit_message>
Feat(chp3): Ajout des commentaire de documentation
</commit_message>
<xml_diff>
--- a/source/Chapitre 3 - Structures conditionnelles.pptx
+++ b/source/Chapitre 3 - Structures conditionnelles.pptx
@@ -1422,7 +1422,7 @@
   <pc:docChgLst>
     <pc:chgData name="Ismaël Tuo" userId="fca7baf0e513a1e6" providerId="LiveId" clId="{4E0E620D-09F9-4BE3-9F03-2E2526FB828A}"/>
     <pc:docChg chg="undo custSel addSld delSld modSld">
-      <pc:chgData name="Ismaël Tuo" userId="fca7baf0e513a1e6" providerId="LiveId" clId="{4E0E620D-09F9-4BE3-9F03-2E2526FB828A}" dt="2024-02-18T17:53:36.567" v="597" actId="20577"/>
+      <pc:chgData name="Ismaël Tuo" userId="fca7baf0e513a1e6" providerId="LiveId" clId="{4E0E620D-09F9-4BE3-9F03-2E2526FB828A}" dt="2024-06-16T07:04:35.266" v="792" actId="1076"/>
       <pc:docMkLst>
         <pc:docMk/>
       </pc:docMkLst>
@@ -1473,7 +1473,7 @@
         </pc:spChg>
       </pc:sldChg>
       <pc:sldChg chg="modSp mod">
-        <pc:chgData name="Ismaël Tuo" userId="fca7baf0e513a1e6" providerId="LiveId" clId="{4E0E620D-09F9-4BE3-9F03-2E2526FB828A}" dt="2023-11-12T17:33:46.056" v="6" actId="113"/>
+        <pc:chgData name="Ismaël Tuo" userId="fca7baf0e513a1e6" providerId="LiveId" clId="{4E0E620D-09F9-4BE3-9F03-2E2526FB828A}" dt="2024-06-16T07:04:35.266" v="792" actId="1076"/>
         <pc:sldMkLst>
           <pc:docMk/>
           <pc:sldMk cId="377111821" sldId="287"/>
@@ -1486,6 +1486,46 @@
             <ac:spMk id="6" creationId="{84F10693-2FE8-EFC8-8DB6-84BFD181D260}"/>
           </ac:spMkLst>
         </pc:spChg>
+        <pc:spChg chg="mod">
+          <ac:chgData name="Ismaël Tuo" userId="fca7baf0e513a1e6" providerId="LiveId" clId="{4E0E620D-09F9-4BE3-9F03-2E2526FB828A}" dt="2024-06-16T07:02:57.095" v="689" actId="1076"/>
+          <ac:spMkLst>
+            <pc:docMk/>
+            <pc:sldMk cId="377111821" sldId="287"/>
+            <ac:spMk id="9" creationId="{0B1D541E-5818-C652-BB3B-A961F3DB154C}"/>
+          </ac:spMkLst>
+        </pc:spChg>
+        <pc:spChg chg="mod">
+          <ac:chgData name="Ismaël Tuo" userId="fca7baf0e513a1e6" providerId="LiveId" clId="{4E0E620D-09F9-4BE3-9F03-2E2526FB828A}" dt="2024-06-16T07:04:35.266" v="792" actId="1076"/>
+          <ac:spMkLst>
+            <pc:docMk/>
+            <pc:sldMk cId="377111821" sldId="287"/>
+            <ac:spMk id="10" creationId="{40F8BACE-0AFA-D6AF-64D8-C46BC8854EE1}"/>
+          </ac:spMkLst>
+        </pc:spChg>
+        <pc:picChg chg="mod">
+          <ac:chgData name="Ismaël Tuo" userId="fca7baf0e513a1e6" providerId="LiveId" clId="{4E0E620D-09F9-4BE3-9F03-2E2526FB828A}" dt="2024-06-16T07:02:51.869" v="688" actId="1076"/>
+          <ac:picMkLst>
+            <pc:docMk/>
+            <pc:sldMk cId="377111821" sldId="287"/>
+            <ac:picMk id="13" creationId="{EC05EBB8-07EE-5E9D-8F1E-57FD01FA1F7A}"/>
+          </ac:picMkLst>
+        </pc:picChg>
+        <pc:picChg chg="mod">
+          <ac:chgData name="Ismaël Tuo" userId="fca7baf0e513a1e6" providerId="LiveId" clId="{4E0E620D-09F9-4BE3-9F03-2E2526FB828A}" dt="2024-06-16T07:04:30.031" v="790" actId="1076"/>
+          <ac:picMkLst>
+            <pc:docMk/>
+            <pc:sldMk cId="377111821" sldId="287"/>
+            <ac:picMk id="15" creationId="{3AD2C33A-356D-9C85-0A24-6DE5F080A413}"/>
+          </ac:picMkLst>
+        </pc:picChg>
+        <pc:picChg chg="mod">
+          <ac:chgData name="Ismaël Tuo" userId="fca7baf0e513a1e6" providerId="LiveId" clId="{4E0E620D-09F9-4BE3-9F03-2E2526FB828A}" dt="2024-06-16T07:04:32.169" v="791" actId="1076"/>
+          <ac:picMkLst>
+            <pc:docMk/>
+            <pc:sldMk cId="377111821" sldId="287"/>
+            <ac:picMk id="17" creationId="{7D19D95F-D5DA-4019-10A5-E9EACD424525}"/>
+          </ac:picMkLst>
+        </pc:picChg>
       </pc:sldChg>
       <pc:sldChg chg="modSp mod">
         <pc:chgData name="Ismaël Tuo" userId="fca7baf0e513a1e6" providerId="LiveId" clId="{4E0E620D-09F9-4BE3-9F03-2E2526FB828A}" dt="2023-11-12T17:33:55.361" v="8" actId="114"/>
@@ -2005,7 +2045,7 @@
           <a:p>
             <a:fld id="{5D1B8971-FAD5-A544-A565-5C81831E2E08}" type="datetimeFigureOut">
               <a:rPr lang="fr-FR" smtClean="0"/>
-              <a:t>18/02/2024</a:t>
+              <a:t>16/06/2024</a:t>
             </a:fld>
             <a:endParaRPr lang="fr-FR"/>
           </a:p>
@@ -2855,7 +2895,7 @@
           <a:p>
             <a:fld id="{446AF453-C717-E044-9B61-C449088DBB9F}" type="datetime1">
               <a:rPr lang="fr-FR" smtClean="0"/>
-              <a:t>18/02/2024</a:t>
+              <a:t>16/06/2024</a:t>
             </a:fld>
             <a:endParaRPr lang="fr-FR"/>
           </a:p>
@@ -3029,7 +3069,7 @@
           <a:p>
             <a:fld id="{0AD74B8B-4B66-A54B-A7E1-EB9F6C09CE67}" type="datetime1">
               <a:rPr lang="fr-FR" smtClean="0"/>
-              <a:t>18/02/2024</a:t>
+              <a:t>16/06/2024</a:t>
             </a:fld>
             <a:endParaRPr lang="fr-FR"/>
           </a:p>
@@ -3213,7 +3253,7 @@
           <a:p>
             <a:fld id="{9584F9F2-42A0-CD42-8013-986AEAF97421}" type="datetime1">
               <a:rPr lang="fr-FR" smtClean="0"/>
-              <a:t>18/02/2024</a:t>
+              <a:t>16/06/2024</a:t>
             </a:fld>
             <a:endParaRPr lang="fr-FR"/>
           </a:p>
@@ -3387,7 +3427,7 @@
           <a:p>
             <a:fld id="{DAB9BD9F-3179-BB4C-96AB-C40862581685}" type="datetime1">
               <a:rPr lang="fr-FR" smtClean="0"/>
-              <a:t>18/02/2024</a:t>
+              <a:t>16/06/2024</a:t>
             </a:fld>
             <a:endParaRPr lang="fr-FR"/>
           </a:p>
@@ -3659,7 +3699,7 @@
           <a:p>
             <a:fld id="{A664DE96-64FF-BC43-8A9C-18ED43A528D6}" type="datetime1">
               <a:rPr lang="fr-FR" smtClean="0"/>
-              <a:t>18/02/2024</a:t>
+              <a:t>16/06/2024</a:t>
             </a:fld>
             <a:endParaRPr lang="fr-FR"/>
           </a:p>
@@ -3895,7 +3935,7 @@
           <a:p>
             <a:fld id="{2C8FE800-9F9B-1C4F-A1CD-9EF46842C4CA}" type="datetime1">
               <a:rPr lang="fr-FR" smtClean="0"/>
-              <a:t>18/02/2024</a:t>
+              <a:t>16/06/2024</a:t>
             </a:fld>
             <a:endParaRPr lang="fr-FR"/>
           </a:p>
@@ -4258,7 +4298,7 @@
           <a:p>
             <a:fld id="{0F7DED4E-8CB4-EF40-A349-EFC02EC7784E}" type="datetime1">
               <a:rPr lang="fr-FR" smtClean="0"/>
-              <a:t>18/02/2024</a:t>
+              <a:t>16/06/2024</a:t>
             </a:fld>
             <a:endParaRPr lang="fr-FR"/>
           </a:p>
@@ -4403,7 +4443,7 @@
           <a:p>
             <a:fld id="{5BB88D77-E8A2-E24F-81D2-817E60779F3E}" type="datetime1">
               <a:rPr lang="fr-FR" smtClean="0"/>
-              <a:t>18/02/2024</a:t>
+              <a:t>16/06/2024</a:t>
             </a:fld>
             <a:endParaRPr lang="fr-FR"/>
           </a:p>
@@ -4502,7 +4542,7 @@
           <a:p>
             <a:fld id="{817F964E-5B57-884A-A1B8-925BFA5276AF}" type="datetime1">
               <a:rPr lang="fr-FR" smtClean="0"/>
-              <a:t>18/02/2024</a:t>
+              <a:t>16/06/2024</a:t>
             </a:fld>
             <a:endParaRPr lang="fr-FR"/>
           </a:p>
@@ -4863,7 +4903,7 @@
           <a:p>
             <a:fld id="{D5636CD0-A2E6-1543-A0E5-C829C16FEE55}" type="datetime1">
               <a:rPr lang="fr-FR" smtClean="0"/>
-              <a:t>18/02/2024</a:t>
+              <a:t>16/06/2024</a:t>
             </a:fld>
             <a:endParaRPr lang="fr-FR"/>
           </a:p>
@@ -5224,7 +5264,7 @@
           <a:p>
             <a:fld id="{CEE5CE4A-5B1A-1846-BA66-722BDB7A9525}" type="datetime1">
               <a:rPr lang="fr-FR" smtClean="0"/>
-              <a:t>18/02/2024</a:t>
+              <a:t>16/06/2024</a:t>
             </a:fld>
             <a:endParaRPr lang="fr-FR"/>
           </a:p>
@@ -5471,7 +5511,7 @@
           <a:p>
             <a:fld id="{55A13D9C-CA6E-9C45-8634-4423EBFFD553}" type="datetime1">
               <a:rPr lang="fr-FR" smtClean="0"/>
-              <a:t>18/02/2024</a:t>
+              <a:t>16/06/2024</a:t>
             </a:fld>
             <a:endParaRPr lang="fr-FR"/>
           </a:p>
@@ -8876,8 +8916,8 @@
         </p:nvSpPr>
         <p:spPr>
           <a:xfrm>
-            <a:off x="449248" y="1774090"/>
-            <a:ext cx="10895817" cy="400110"/>
+            <a:off x="350872" y="1812279"/>
+            <a:ext cx="12116682" cy="707886"/>
           </a:xfrm>
           <a:prstGeom prst="rect">
             <a:avLst/>
@@ -8902,7 +8942,7 @@
                 <a:latin typeface="Times New Roman" panose="02020603050405020304" pitchFamily="18" charset="0"/>
                 <a:cs typeface="Times New Roman" panose="02020603050405020304" pitchFamily="18" charset="0"/>
               </a:rPr>
-              <a:t>commence par le caractère dièse #.</a:t>
+              <a:t>commence par le caractère dièse # (utilisé pour commenter le code utile pour le développeur.).</a:t>
             </a:r>
             <a:endParaRPr lang="fr-FR" sz="2000" b="1" dirty="0">
               <a:latin typeface="Times New Roman" panose="02020603050405020304" pitchFamily="18" charset="0"/>
@@ -8925,7 +8965,7 @@
         </p:nvSpPr>
         <p:spPr>
           <a:xfrm>
-            <a:off x="449248" y="3277842"/>
+            <a:off x="500932" y="3695625"/>
             <a:ext cx="10999184" cy="707886"/>
           </a:xfrm>
           <a:prstGeom prst="rect">
@@ -8951,7 +8991,7 @@
                 <a:latin typeface="Times New Roman" panose="02020603050405020304" pitchFamily="18" charset="0"/>
                 <a:cs typeface="Times New Roman" panose="02020603050405020304" pitchFamily="18" charset="0"/>
               </a:rPr>
-              <a:t>commentaires sur plusieurs lignes encadrées par 3 guillemets doubles ou simples.</a:t>
+              <a:t>commentaires sur plusieurs lignes encadrées par 3 guillemets doubles ou simples (utile pour faire de la documentation de code pour les autres.).</a:t>
             </a:r>
             <a:endParaRPr lang="fr-FR" sz="2000" b="1" dirty="0">
               <a:latin typeface="Times New Roman" panose="02020603050405020304" pitchFamily="18" charset="0"/>
@@ -8982,7 +9022,7 @@
         </p:blipFill>
         <p:spPr>
           <a:xfrm>
-            <a:off x="2878589" y="2323125"/>
+            <a:off x="2878589" y="2605515"/>
             <a:ext cx="4622800" cy="711200"/>
           </a:xfrm>
           <a:prstGeom prst="rect">
@@ -9012,7 +9052,7 @@
         </p:blipFill>
         <p:spPr>
           <a:xfrm>
-            <a:off x="868564" y="4263888"/>
+            <a:off x="567189" y="4939148"/>
             <a:ext cx="4622800" cy="939800"/>
           </a:xfrm>
           <a:prstGeom prst="rect">
@@ -9042,7 +9082,7 @@
         </p:blipFill>
         <p:spPr>
           <a:xfrm>
-            <a:off x="6700636" y="4171168"/>
+            <a:off x="6319002" y="4939148"/>
             <a:ext cx="4622800" cy="939800"/>
           </a:xfrm>
           <a:prstGeom prst="rect">
@@ -12070,8 +12110,8 @@
           </a:p>
         </p:txBody>
       </p:sp>
-      <mc:AlternateContent xmlns:mc="http://schemas.openxmlformats.org/markup-compatibility/2006">
-        <mc:Choice xmlns:a14="http://schemas.microsoft.com/office/drawing/2010/main" Requires="a14">
+      <mc:AlternateContent xmlns:mc="http://schemas.openxmlformats.org/markup-compatibility/2006" xmlns:a14="http://schemas.microsoft.com/office/drawing/2010/main">
+        <mc:Choice Requires="a14">
           <p:sp>
             <p:nvSpPr>
               <p:cNvPr id="7" name="ZoneTexte 6">
@@ -12179,7 +12219,7 @@
             </p:txBody>
           </p:sp>
         </mc:Choice>
-        <mc:Fallback>
+        <mc:Fallback xmlns="">
           <p:sp>
             <p:nvSpPr>
               <p:cNvPr id="7" name="ZoneTexte 6">

</xml_diff>